<commit_message>
Nov 29th 2021 Update
</commit_message>
<xml_diff>
--- a/images/alliance-leadership/Brave-Leadership.pptx
+++ b/images/alliance-leadership/Brave-Leadership.pptx
@@ -330,6 +330,91 @@
 </p:cmAuthorLst>
 </file>
 
+<file path=ppt/revisionInfo.xml><?xml version="1.0" encoding="utf-8"?>
+<p1510:revInfo xmlns:a="http://schemas.openxmlformats.org/drawingml/2006/main" xmlns:r="http://schemas.openxmlformats.org/officeDocument/2006/relationships" xmlns:p1510="http://schemas.microsoft.com/office/powerpoint/2015/10/main">
+  <p1510:revLst>
+    <p1510:client id="{0CD06005-BE02-46D1-B07A-48E42C56809F}" v="5" dt="2021-11-29T23:04:16.369"/>
+  </p1510:revLst>
+</p1510:revInfo>
+</file>
+
+<file path=ppt/changesInfos/changesInfo1.xml><?xml version="1.0" encoding="utf-8"?>
+<pc:chgInfo xmlns:a="http://schemas.openxmlformats.org/drawingml/2006/main" xmlns:r="http://schemas.openxmlformats.org/officeDocument/2006/relationships" xmlns:ac="http://schemas.microsoft.com/office/drawing/2013/main/command" xmlns:pc="http://schemas.microsoft.com/office/powerpoint/2013/main/command">
+  <pc:docChgLst>
+    <pc:chgData name="Aiden Jepson" userId="27ac3319768fac1a" providerId="LiveId" clId="{0CD06005-BE02-46D1-B07A-48E42C56809F}"/>
+    <pc:docChg chg="undo redo custSel modSld">
+      <pc:chgData name="Aiden Jepson" userId="27ac3319768fac1a" providerId="LiveId" clId="{0CD06005-BE02-46D1-B07A-48E42C56809F}" dt="2021-11-29T23:02:52.459" v="21" actId="20577"/>
+      <pc:docMkLst>
+        <pc:docMk/>
+      </pc:docMkLst>
+      <pc:sldChg chg="addSp delSp modSp mod">
+        <pc:chgData name="Aiden Jepson" userId="27ac3319768fac1a" providerId="LiveId" clId="{0CD06005-BE02-46D1-B07A-48E42C56809F}" dt="2021-11-29T23:02:52.459" v="21" actId="20577"/>
+        <pc:sldMkLst>
+          <pc:docMk/>
+          <pc:sldMk cId="180280424" sldId="326"/>
+        </pc:sldMkLst>
+        <pc:spChg chg="add del mod">
+          <ac:chgData name="Aiden Jepson" userId="27ac3319768fac1a" providerId="LiveId" clId="{0CD06005-BE02-46D1-B07A-48E42C56809F}" dt="2021-11-29T23:01:26.269" v="9"/>
+          <ac:spMkLst>
+            <pc:docMk/>
+            <pc:sldMk cId="180280424" sldId="326"/>
+            <ac:spMk id="136" creationId="{DA74FB85-1701-4C5F-8E19-D98D7F2C7BB9}"/>
+          </ac:spMkLst>
+        </pc:spChg>
+        <pc:spChg chg="mod">
+          <ac:chgData name="Aiden Jepson" userId="27ac3319768fac1a" providerId="LiveId" clId="{0CD06005-BE02-46D1-B07A-48E42C56809F}" dt="2021-11-29T23:00:57.879" v="2" actId="20577"/>
+          <ac:spMkLst>
+            <pc:docMk/>
+            <pc:sldMk cId="180280424" sldId="326"/>
+            <ac:spMk id="140" creationId="{D885C9C9-DFF7-4F23-BF55-443583094A88}"/>
+          </ac:spMkLst>
+        </pc:spChg>
+        <pc:spChg chg="mod">
+          <ac:chgData name="Aiden Jepson" userId="27ac3319768fac1a" providerId="LiveId" clId="{0CD06005-BE02-46D1-B07A-48E42C56809F}" dt="2021-11-29T23:01:32.777" v="12" actId="20577"/>
+          <ac:spMkLst>
+            <pc:docMk/>
+            <pc:sldMk cId="180280424" sldId="326"/>
+            <ac:spMk id="141" creationId="{7F06402D-4F5A-4766-84E6-5C262AC2DC70}"/>
+          </ac:spMkLst>
+        </pc:spChg>
+        <pc:spChg chg="mod">
+          <ac:chgData name="Aiden Jepson" userId="27ac3319768fac1a" providerId="LiveId" clId="{0CD06005-BE02-46D1-B07A-48E42C56809F}" dt="2021-11-29T23:02:52.459" v="21" actId="20577"/>
+          <ac:spMkLst>
+            <pc:docMk/>
+            <pc:sldMk cId="180280424" sldId="326"/>
+            <ac:spMk id="197" creationId="{C5C94788-395C-4F32-BBA6-E146849DDD96}"/>
+          </ac:spMkLst>
+        </pc:spChg>
+        <pc:spChg chg="mod">
+          <ac:chgData name="Aiden Jepson" userId="27ac3319768fac1a" providerId="LiveId" clId="{0CD06005-BE02-46D1-B07A-48E42C56809F}" dt="2021-11-29T23:01:46.632" v="14" actId="20577"/>
+          <ac:spMkLst>
+            <pc:docMk/>
+            <pc:sldMk cId="180280424" sldId="326"/>
+            <ac:spMk id="198" creationId="{B8D91B18-378E-4C75-83E6-CDF1619B35C7}"/>
+          </ac:spMkLst>
+        </pc:spChg>
+        <pc:picChg chg="add del">
+          <ac:chgData name="Aiden Jepson" userId="27ac3319768fac1a" providerId="LiveId" clId="{0CD06005-BE02-46D1-B07A-48E42C56809F}" dt="2021-11-29T23:01:28.525" v="11" actId="478"/>
+          <ac:picMkLst>
+            <pc:docMk/>
+            <pc:sldMk cId="180280424" sldId="326"/>
+            <ac:picMk id="142" creationId="{374C8887-9E3F-4583-8A55-3044C30B9DB5}"/>
+          </ac:picMkLst>
+        </pc:picChg>
+        <pc:picChg chg="del">
+          <ac:chgData name="Aiden Jepson" userId="27ac3319768fac1a" providerId="LiveId" clId="{0CD06005-BE02-46D1-B07A-48E42C56809F}" dt="2021-11-29T23:01:43.520" v="13" actId="478"/>
+          <ac:picMkLst>
+            <pc:docMk/>
+            <pc:sldMk cId="180280424" sldId="326"/>
+            <ac:picMk id="200" creationId="{5026E8E9-6A2C-4E14-B660-D1A2D6C220DA}"/>
+          </ac:picMkLst>
+        </pc:picChg>
+      </pc:sldChg>
+    </pc:docChg>
+  </pc:docChgLst>
+</pc:chgInfo>
+</file>
+
 <file path=ppt/notesMasters/notesMaster1.xml><?xml version="1.0" encoding="utf-8"?>
 <p:notesMaster xmlns:a="http://schemas.openxmlformats.org/drawingml/2006/main" xmlns:r="http://schemas.openxmlformats.org/officeDocument/2006/relationships" xmlns:p="http://schemas.openxmlformats.org/presentationml/2006/main">
   <p:cSld>
@@ -626,7 +711,7 @@
           <a:lstStyle/>
           <a:p>
             <a:fld id="{86CB4B4D-7CA3-9044-876B-883B54F8677D}" type="slidenum">
-              <a:t>‹N°›</a:t>
+              <a:t>‹#›</a:t>
             </a:fld>
             <a:endParaRPr dirty="0"/>
           </a:p>
@@ -2039,7 +2124,7 @@
           </a:ln>
           <a:extLst>
             <a:ext uri="{C572A759-6A51-4108-AA02-DFA0A04FC94B}">
-              <ma14:wrappingTextBoxFlag xmlns="" xmlns:m="http://schemas.openxmlformats.org/officeDocument/2006/math" xmlns:a14="http://schemas.microsoft.com/office/drawing/2010/main" xmlns:ma14="http://schemas.microsoft.com/office/mac/drawingml/2011/main" val="1"/>
+              <ma14:wrappingTextBoxFlag xmlns:ma14="http://schemas.microsoft.com/office/mac/drawingml/2011/main" xmlns:a14="http://schemas.microsoft.com/office/drawing/2010/main" xmlns:m="http://schemas.openxmlformats.org/officeDocument/2006/math" xmlns="" val="1"/>
             </a:ext>
           </a:extLst>
         </p:spPr>
@@ -2078,7 +2163,7 @@
           </a:ln>
           <a:extLst>
             <a:ext uri="{C572A759-6A51-4108-AA02-DFA0A04FC94B}">
-              <ma14:wrappingTextBoxFlag xmlns="" xmlns:m="http://schemas.openxmlformats.org/officeDocument/2006/math" xmlns:a14="http://schemas.microsoft.com/office/drawing/2010/main" xmlns:ma14="http://schemas.microsoft.com/office/mac/drawingml/2011/main" val="1"/>
+              <ma14:wrappingTextBoxFlag xmlns:ma14="http://schemas.microsoft.com/office/mac/drawingml/2011/main" xmlns:a14="http://schemas.microsoft.com/office/drawing/2010/main" xmlns:m="http://schemas.openxmlformats.org/officeDocument/2006/math" xmlns="" val="1"/>
             </a:ext>
           </a:extLst>
         </p:spPr>
@@ -2156,7 +2241,7 @@
           </a:lstStyle>
           <a:p>
             <a:fld id="{86CB4B4D-7CA3-9044-876B-883B54F8677D}" type="slidenum">
-              <a:t>‹N°›</a:t>
+              <a:t>‹#›</a:t>
             </a:fld>
             <a:endParaRPr dirty="0"/>
           </a:p>
@@ -3723,7 +3808,7 @@
           <a:effectLst/>
           <a:extLst>
             <a:ext uri="{C572A759-6A51-4108-AA02-DFA0A04FC94B}">
-              <ma14:wrappingTextBoxFlag xmlns="" xmlns:m="http://schemas.openxmlformats.org/officeDocument/2006/math" xmlns:a14="http://schemas.microsoft.com/office/drawing/2010/main" xmlns:ma14="http://schemas.microsoft.com/office/mac/drawingml/2011/main" val="1"/>
+              <ma14:wrappingTextBoxFlag xmlns:ma14="http://schemas.microsoft.com/office/mac/drawingml/2011/main" xmlns:a14="http://schemas.microsoft.com/office/drawing/2010/main" xmlns:m="http://schemas.openxmlformats.org/officeDocument/2006/math" xmlns="" val="1"/>
             </a:ext>
           </a:extLst>
         </p:spPr>
@@ -4026,7 +4111,7 @@
           <a:effectLst/>
           <a:extLst>
             <a:ext uri="{C572A759-6A51-4108-AA02-DFA0A04FC94B}">
-              <ma14:wrappingTextBoxFlag xmlns="" xmlns:m="http://schemas.openxmlformats.org/officeDocument/2006/math" xmlns:a14="http://schemas.microsoft.com/office/drawing/2010/main" xmlns:ma14="http://schemas.microsoft.com/office/mac/drawingml/2011/main" val="1"/>
+              <ma14:wrappingTextBoxFlag xmlns:ma14="http://schemas.microsoft.com/office/mac/drawingml/2011/main" xmlns:a14="http://schemas.microsoft.com/office/drawing/2010/main" xmlns:m="http://schemas.openxmlformats.org/officeDocument/2006/math" xmlns="" val="1"/>
             </a:ext>
           </a:extLst>
         </p:spPr>
@@ -4473,7 +4558,7 @@
           <a:effectLst/>
           <a:extLst>
             <a:ext uri="{C572A759-6A51-4108-AA02-DFA0A04FC94B}">
-              <ma14:wrappingTextBoxFlag xmlns="" xmlns:m="http://schemas.openxmlformats.org/officeDocument/2006/math" xmlns:a14="http://schemas.microsoft.com/office/drawing/2010/main" xmlns:ma14="http://schemas.microsoft.com/office/mac/drawingml/2011/main" val="1"/>
+              <ma14:wrappingTextBoxFlag xmlns:ma14="http://schemas.microsoft.com/office/mac/drawingml/2011/main" xmlns:a14="http://schemas.microsoft.com/office/drawing/2010/main" xmlns:m="http://schemas.openxmlformats.org/officeDocument/2006/math" xmlns="" val="1"/>
             </a:ext>
           </a:extLst>
         </p:spPr>
@@ -4777,7 +4862,7 @@
           <a:effectLst/>
           <a:extLst>
             <a:ext uri="{C572A759-6A51-4108-AA02-DFA0A04FC94B}">
-              <ma14:wrappingTextBoxFlag xmlns="" xmlns:m="http://schemas.openxmlformats.org/officeDocument/2006/math" xmlns:a14="http://schemas.microsoft.com/office/drawing/2010/main" xmlns:ma14="http://schemas.microsoft.com/office/mac/drawingml/2011/main" val="1"/>
+              <ma14:wrappingTextBoxFlag xmlns:ma14="http://schemas.microsoft.com/office/mac/drawingml/2011/main" xmlns:a14="http://schemas.microsoft.com/office/drawing/2010/main" xmlns:m="http://schemas.openxmlformats.org/officeDocument/2006/math" xmlns="" val="1"/>
             </a:ext>
           </a:extLst>
         </p:spPr>
@@ -5077,7 +5162,7 @@
           <a:effectLst/>
           <a:extLst>
             <a:ext uri="{C572A759-6A51-4108-AA02-DFA0A04FC94B}">
-              <ma14:wrappingTextBoxFlag xmlns="" xmlns:m="http://schemas.openxmlformats.org/officeDocument/2006/math" xmlns:a14="http://schemas.microsoft.com/office/drawing/2010/main" xmlns:ma14="http://schemas.microsoft.com/office/mac/drawingml/2011/main" val="1"/>
+              <ma14:wrappingTextBoxFlag xmlns:ma14="http://schemas.microsoft.com/office/mac/drawingml/2011/main" xmlns:a14="http://schemas.microsoft.com/office/drawing/2010/main" xmlns:m="http://schemas.openxmlformats.org/officeDocument/2006/math" xmlns="" val="1"/>
             </a:ext>
           </a:extLst>
         </p:spPr>
@@ -5381,7 +5466,7 @@
           <a:effectLst/>
           <a:extLst>
             <a:ext uri="{C572A759-6A51-4108-AA02-DFA0A04FC94B}">
-              <ma14:wrappingTextBoxFlag xmlns="" xmlns:m="http://schemas.openxmlformats.org/officeDocument/2006/math" xmlns:a14="http://schemas.microsoft.com/office/drawing/2010/main" xmlns:ma14="http://schemas.microsoft.com/office/mac/drawingml/2011/main" val="1"/>
+              <ma14:wrappingTextBoxFlag xmlns:ma14="http://schemas.microsoft.com/office/mac/drawingml/2011/main" xmlns:a14="http://schemas.microsoft.com/office/drawing/2010/main" xmlns:m="http://schemas.openxmlformats.org/officeDocument/2006/math" xmlns="" val="1"/>
             </a:ext>
           </a:extLst>
         </p:spPr>
@@ -5982,7 +6067,7 @@
           <a:effectLst/>
           <a:extLst>
             <a:ext uri="{C572A759-6A51-4108-AA02-DFA0A04FC94B}">
-              <ma14:wrappingTextBoxFlag xmlns="" xmlns:m="http://schemas.openxmlformats.org/officeDocument/2006/math" xmlns:a14="http://schemas.microsoft.com/office/drawing/2010/main" xmlns:ma14="http://schemas.microsoft.com/office/mac/drawingml/2011/main" val="1"/>
+              <ma14:wrappingTextBoxFlag xmlns:ma14="http://schemas.microsoft.com/office/mac/drawingml/2011/main" xmlns:a14="http://schemas.microsoft.com/office/drawing/2010/main" xmlns:m="http://schemas.openxmlformats.org/officeDocument/2006/math" xmlns="" val="1"/>
             </a:ext>
           </a:extLst>
         </p:spPr>
@@ -6107,7 +6192,7 @@
           </a:ln>
           <a:extLst>
             <a:ext uri="{C572A759-6A51-4108-AA02-DFA0A04FC94B}">
-              <ma14:wrappingTextBoxFlag xmlns="" xmlns:m="http://schemas.openxmlformats.org/officeDocument/2006/math" xmlns:a14="http://schemas.microsoft.com/office/drawing/2010/main" xmlns:ma14="http://schemas.microsoft.com/office/mac/drawingml/2011/main" val="1"/>
+              <ma14:wrappingTextBoxFlag xmlns:ma14="http://schemas.microsoft.com/office/mac/drawingml/2011/main" xmlns:a14="http://schemas.microsoft.com/office/drawing/2010/main" xmlns:m="http://schemas.openxmlformats.org/officeDocument/2006/math" xmlns="" val="1"/>
             </a:ext>
           </a:extLst>
         </p:spPr>
@@ -6346,7 +6431,7 @@
           <a:effectLst/>
           <a:extLst>
             <a:ext uri="{C572A759-6A51-4108-AA02-DFA0A04FC94B}">
-              <ma14:wrappingTextBoxFlag xmlns="" xmlns:m="http://schemas.openxmlformats.org/officeDocument/2006/math" xmlns:a14="http://schemas.microsoft.com/office/drawing/2010/main" xmlns:ma14="http://schemas.microsoft.com/office/mac/drawingml/2011/main" val="1"/>
+              <ma14:wrappingTextBoxFlag xmlns:ma14="http://schemas.microsoft.com/office/mac/drawingml/2011/main" xmlns:a14="http://schemas.microsoft.com/office/drawing/2010/main" xmlns:m="http://schemas.openxmlformats.org/officeDocument/2006/math" xmlns="" val="1"/>
             </a:ext>
           </a:extLst>
         </p:spPr>
@@ -6470,7 +6555,7 @@
           </a:ln>
           <a:extLst>
             <a:ext uri="{C572A759-6A51-4108-AA02-DFA0A04FC94B}">
-              <ma14:wrappingTextBoxFlag xmlns="" xmlns:m="http://schemas.openxmlformats.org/officeDocument/2006/math" xmlns:a14="http://schemas.microsoft.com/office/drawing/2010/main" xmlns:ma14="http://schemas.microsoft.com/office/mac/drawingml/2011/main" val="1"/>
+              <ma14:wrappingTextBoxFlag xmlns:ma14="http://schemas.microsoft.com/office/mac/drawingml/2011/main" xmlns:a14="http://schemas.microsoft.com/office/drawing/2010/main" xmlns:m="http://schemas.openxmlformats.org/officeDocument/2006/math" xmlns="" val="1"/>
             </a:ext>
           </a:extLst>
         </p:spPr>
@@ -6713,7 +6798,7 @@
           <a:effectLst/>
           <a:extLst>
             <a:ext uri="{C572A759-6A51-4108-AA02-DFA0A04FC94B}">
-              <ma14:wrappingTextBoxFlag xmlns="" xmlns:m="http://schemas.openxmlformats.org/officeDocument/2006/math" xmlns:a14="http://schemas.microsoft.com/office/drawing/2010/main" xmlns:ma14="http://schemas.microsoft.com/office/mac/drawingml/2011/main" val="1"/>
+              <ma14:wrappingTextBoxFlag xmlns:ma14="http://schemas.microsoft.com/office/mac/drawingml/2011/main" xmlns:a14="http://schemas.microsoft.com/office/drawing/2010/main" xmlns:m="http://schemas.openxmlformats.org/officeDocument/2006/math" xmlns="" val="1"/>
             </a:ext>
           </a:extLst>
         </p:spPr>
@@ -6836,7 +6921,7 @@
           </a:ln>
           <a:extLst>
             <a:ext uri="{C572A759-6A51-4108-AA02-DFA0A04FC94B}">
-              <ma14:wrappingTextBoxFlag xmlns="" xmlns:m="http://schemas.openxmlformats.org/officeDocument/2006/math" xmlns:a14="http://schemas.microsoft.com/office/drawing/2010/main" xmlns:ma14="http://schemas.microsoft.com/office/mac/drawingml/2011/main" val="1"/>
+              <ma14:wrappingTextBoxFlag xmlns:ma14="http://schemas.microsoft.com/office/mac/drawingml/2011/main" xmlns:a14="http://schemas.microsoft.com/office/drawing/2010/main" xmlns:m="http://schemas.openxmlformats.org/officeDocument/2006/math" xmlns="" val="1"/>
             </a:ext>
           </a:extLst>
         </p:spPr>
@@ -7079,7 +7164,7 @@
           <a:effectLst/>
           <a:extLst>
             <a:ext uri="{C572A759-6A51-4108-AA02-DFA0A04FC94B}">
-              <ma14:wrappingTextBoxFlag xmlns="" xmlns:m="http://schemas.openxmlformats.org/officeDocument/2006/math" xmlns:a14="http://schemas.microsoft.com/office/drawing/2010/main" xmlns:ma14="http://schemas.microsoft.com/office/mac/drawingml/2011/main" val="1"/>
+              <ma14:wrappingTextBoxFlag xmlns:ma14="http://schemas.microsoft.com/office/mac/drawingml/2011/main" xmlns:a14="http://schemas.microsoft.com/office/drawing/2010/main" xmlns:m="http://schemas.openxmlformats.org/officeDocument/2006/math" xmlns="" val="1"/>
             </a:ext>
           </a:extLst>
         </p:spPr>
@@ -7103,7 +7188,7 @@
           <a:p>
             <a:r>
               <a:rPr lang="fr-FR" dirty="0"/>
-              <a:t>Elana Damondred</a:t>
+              <a:t>TBD</a:t>
             </a:r>
           </a:p>
           <a:p>
@@ -7150,6 +7235,17 @@
           </a:bodyPr>
           <a:lstStyle/>
           <a:p>
+            <a:r>
+              <a:rPr lang="en-US" sz="3200" b="0" dirty="0">
+                <a:solidFill>
+                  <a:srgbClr val="FFFFFF"/>
+                </a:solidFill>
+                <a:latin typeface="+mn-lt"/>
+                <a:ea typeface="+mn-ea"/>
+                <a:cs typeface="+mn-cs"/>
+              </a:rPr>
+              <a:t>?</a:t>
+            </a:r>
             <a:endParaRPr sz="3200" b="0" dirty="0">
               <a:solidFill>
                 <a:srgbClr val="FFFFFF"/>
@@ -7161,52 +7257,6 @@
           </a:p>
         </p:txBody>
       </p:sp>
-      <p:pic>
-        <p:nvPicPr>
-          <p:cNvPr id="142" name="Espace réservé pour une image  18">
-            <a:extLst>
-              <a:ext uri="{FF2B5EF4-FFF2-40B4-BE49-F238E27FC236}">
-                <a16:creationId xmlns:a16="http://schemas.microsoft.com/office/drawing/2014/main" id="{374C8887-9E3F-4583-8A55-3044C30B9DB5}"/>
-              </a:ext>
-            </a:extLst>
-          </p:cNvPr>
-          <p:cNvPicPr>
-            <a:picLocks noChangeAspect="1"/>
-          </p:cNvPicPr>
-          <p:nvPr/>
-        </p:nvPicPr>
-        <p:blipFill rotWithShape="1">
-          <a:blip r:embed="rId12">
-            <a:extLst>
-              <a:ext uri="{28A0092B-C50C-407E-A947-70E740481C1C}">
-                <a14:useLocalDpi xmlns:a14="http://schemas.microsoft.com/office/drawing/2010/main" val="0"/>
-              </a:ext>
-            </a:extLst>
-          </a:blip>
-          <a:srcRect t="4015" b="4015"/>
-          <a:stretch/>
-        </p:blipFill>
-        <p:spPr>
-          <a:xfrm>
-            <a:off x="3109125" y="2788842"/>
-            <a:ext cx="790904" cy="790904"/>
-          </a:xfrm>
-          <a:prstGeom prst="ellipse">
-            <a:avLst/>
-          </a:prstGeom>
-          <a:solidFill>
-            <a:srgbClr val="ECECEC"/>
-          </a:solidFill>
-          <a:ln w="12700">
-            <a:miter lim="400000"/>
-          </a:ln>
-          <a:extLst>
-            <a:ext uri="{C572A759-6A51-4108-AA02-DFA0A04FC94B}">
-              <ma14:wrappingTextBoxFlag xmlns="" xmlns:m="http://schemas.openxmlformats.org/officeDocument/2006/math" xmlns:a14="http://schemas.microsoft.com/office/drawing/2010/main" xmlns:ma14="http://schemas.microsoft.com/office/mac/drawingml/2011/main" val="1"/>
-            </a:ext>
-          </a:extLst>
-        </p:spPr>
-      </p:pic>
       <p:sp>
         <p:nvSpPr>
           <p:cNvPr id="143" name="Shape">
@@ -7445,7 +7495,7 @@
           <a:effectLst/>
           <a:extLst>
             <a:ext uri="{C572A759-6A51-4108-AA02-DFA0A04FC94B}">
-              <ma14:wrappingTextBoxFlag xmlns="" xmlns:m="http://schemas.openxmlformats.org/officeDocument/2006/math" xmlns:a14="http://schemas.microsoft.com/office/drawing/2010/main" xmlns:ma14="http://schemas.microsoft.com/office/mac/drawingml/2011/main" val="1"/>
+              <ma14:wrappingTextBoxFlag xmlns:ma14="http://schemas.microsoft.com/office/mac/drawingml/2011/main" xmlns:a14="http://schemas.microsoft.com/office/drawing/2010/main" xmlns:m="http://schemas.openxmlformats.org/officeDocument/2006/math" xmlns="" val="1"/>
             </a:ext>
           </a:extLst>
         </p:spPr>
@@ -7776,7 +7826,7 @@
           <a:effectLst/>
           <a:extLst>
             <a:ext uri="{C572A759-6A51-4108-AA02-DFA0A04FC94B}">
-              <ma14:wrappingTextBoxFlag xmlns="" xmlns:m="http://schemas.openxmlformats.org/officeDocument/2006/math" xmlns:a14="http://schemas.microsoft.com/office/drawing/2010/main" xmlns:ma14="http://schemas.microsoft.com/office/mac/drawingml/2011/main" val="1"/>
+              <ma14:wrappingTextBoxFlag xmlns:ma14="http://schemas.microsoft.com/office/mac/drawingml/2011/main" xmlns:a14="http://schemas.microsoft.com/office/drawing/2010/main" xmlns:m="http://schemas.openxmlformats.org/officeDocument/2006/math" xmlns="" val="1"/>
             </a:ext>
           </a:extLst>
         </p:spPr>
@@ -7873,7 +7923,7 @@
           <p:nvPr/>
         </p:nvPicPr>
         <p:blipFill rotWithShape="1">
-          <a:blip r:embed="rId13">
+          <a:blip r:embed="rId12">
             <a:extLst>
               <a:ext uri="{28A0092B-C50C-407E-A947-70E740481C1C}">
                 <a14:useLocalDpi xmlns:a14="http://schemas.microsoft.com/office/drawing/2010/main" val="0"/>
@@ -7899,7 +7949,7 @@
           </a:ln>
           <a:extLst>
             <a:ext uri="{C572A759-6A51-4108-AA02-DFA0A04FC94B}">
-              <ma14:wrappingTextBoxFlag xmlns="" xmlns:m="http://schemas.openxmlformats.org/officeDocument/2006/math" xmlns:a14="http://schemas.microsoft.com/office/drawing/2010/main" xmlns:ma14="http://schemas.microsoft.com/office/mac/drawingml/2011/main" val="1"/>
+              <ma14:wrappingTextBoxFlag xmlns:ma14="http://schemas.microsoft.com/office/mac/drawingml/2011/main" xmlns:a14="http://schemas.microsoft.com/office/drawing/2010/main" xmlns:m="http://schemas.openxmlformats.org/officeDocument/2006/math" xmlns="" val="1"/>
             </a:ext>
           </a:extLst>
         </p:spPr>
@@ -8142,7 +8192,7 @@
           <a:effectLst/>
           <a:extLst>
             <a:ext uri="{C572A759-6A51-4108-AA02-DFA0A04FC94B}">
-              <ma14:wrappingTextBoxFlag xmlns="" xmlns:m="http://schemas.openxmlformats.org/officeDocument/2006/math" xmlns:a14="http://schemas.microsoft.com/office/drawing/2010/main" xmlns:ma14="http://schemas.microsoft.com/office/mac/drawingml/2011/main" val="1"/>
+              <ma14:wrappingTextBoxFlag xmlns:ma14="http://schemas.microsoft.com/office/mac/drawingml/2011/main" xmlns:a14="http://schemas.microsoft.com/office/drawing/2010/main" xmlns:m="http://schemas.openxmlformats.org/officeDocument/2006/math" xmlns="" val="1"/>
             </a:ext>
           </a:extLst>
         </p:spPr>
@@ -8241,7 +8291,7 @@
           <p:nvPr/>
         </p:nvPicPr>
         <p:blipFill rotWithShape="1">
-          <a:blip r:embed="rId14">
+          <a:blip r:embed="rId13">
             <a:extLst>
               <a:ext uri="{28A0092B-C50C-407E-A947-70E740481C1C}">
                 <a14:useLocalDpi xmlns:a14="http://schemas.microsoft.com/office/drawing/2010/main" val="0"/>
@@ -8267,7 +8317,7 @@
           </a:ln>
           <a:extLst>
             <a:ext uri="{C572A759-6A51-4108-AA02-DFA0A04FC94B}">
-              <ma14:wrappingTextBoxFlag xmlns="" xmlns:m="http://schemas.openxmlformats.org/officeDocument/2006/math" xmlns:a14="http://schemas.microsoft.com/office/drawing/2010/main" xmlns:ma14="http://schemas.microsoft.com/office/mac/drawingml/2011/main" val="1"/>
+              <ma14:wrappingTextBoxFlag xmlns:ma14="http://schemas.microsoft.com/office/mac/drawingml/2011/main" xmlns:a14="http://schemas.microsoft.com/office/drawing/2010/main" xmlns:m="http://schemas.openxmlformats.org/officeDocument/2006/math" xmlns="" val="1"/>
             </a:ext>
           </a:extLst>
         </p:spPr>
@@ -8287,7 +8337,7 @@
           <p:nvPr/>
         </p:nvPicPr>
         <p:blipFill>
-          <a:blip r:embed="rId15">
+          <a:blip r:embed="rId14">
             <a:extLst>
               <a:ext uri="{28A0092B-C50C-407E-A947-70E740481C1C}">
                 <a14:useLocalDpi xmlns:a14="http://schemas.microsoft.com/office/drawing/2010/main" val="0"/>
@@ -8701,7 +8751,7 @@
             <a:effectLst/>
             <a:extLst>
               <a:ext uri="{C572A759-6A51-4108-AA02-DFA0A04FC94B}">
-                <ma14:wrappingTextBoxFlag xmlns="" xmlns:m="http://schemas.openxmlformats.org/officeDocument/2006/math" xmlns:a14="http://schemas.microsoft.com/office/drawing/2010/main" xmlns:ma14="http://schemas.microsoft.com/office/mac/drawingml/2011/main" val="1"/>
+                <ma14:wrappingTextBoxFlag xmlns:ma14="http://schemas.microsoft.com/office/mac/drawingml/2011/main" xmlns:a14="http://schemas.microsoft.com/office/drawing/2010/main" xmlns:m="http://schemas.openxmlformats.org/officeDocument/2006/math" xmlns="" val="1"/>
               </a:ext>
             </a:extLst>
           </p:spPr>
@@ -8800,7 +8850,7 @@
             <p:nvPr/>
           </p:nvPicPr>
           <p:blipFill rotWithShape="1">
-            <a:blip r:embed="rId16">
+            <a:blip r:embed="rId15">
               <a:extLst>
                 <a:ext uri="{28A0092B-C50C-407E-A947-70E740481C1C}">
                   <a14:useLocalDpi xmlns:a14="http://schemas.microsoft.com/office/drawing/2010/main" val="0"/>
@@ -8828,7 +8878,7 @@
             <a:effectLst/>
             <a:extLst>
               <a:ext uri="{C572A759-6A51-4108-AA02-DFA0A04FC94B}">
-                <ma14:wrappingTextBoxFlag xmlns="" xmlns:m="http://schemas.openxmlformats.org/officeDocument/2006/math" xmlns:a14="http://schemas.microsoft.com/office/drawing/2010/main" xmlns:ma14="http://schemas.microsoft.com/office/mac/drawingml/2011/main" val="1"/>
+                <ma14:wrappingTextBoxFlag xmlns:ma14="http://schemas.microsoft.com/office/mac/drawingml/2011/main" xmlns:a14="http://schemas.microsoft.com/office/drawing/2010/main" xmlns:m="http://schemas.openxmlformats.org/officeDocument/2006/math" xmlns="" val="1"/>
               </a:ext>
             </a:extLst>
           </p:spPr>
@@ -9090,7 +9140,7 @@
             <a:effectLst/>
             <a:extLst>
               <a:ext uri="{C572A759-6A51-4108-AA02-DFA0A04FC94B}">
-                <ma14:wrappingTextBoxFlag xmlns="" xmlns:m="http://schemas.openxmlformats.org/officeDocument/2006/math" xmlns:a14="http://schemas.microsoft.com/office/drawing/2010/main" xmlns:ma14="http://schemas.microsoft.com/office/mac/drawingml/2011/main" val="1"/>
+                <ma14:wrappingTextBoxFlag xmlns:ma14="http://schemas.microsoft.com/office/mac/drawingml/2011/main" xmlns:a14="http://schemas.microsoft.com/office/drawing/2010/main" xmlns:m="http://schemas.openxmlformats.org/officeDocument/2006/math" xmlns="" val="1"/>
               </a:ext>
             </a:extLst>
           </p:spPr>
@@ -9189,7 +9239,7 @@
             <p:nvPr/>
           </p:nvPicPr>
           <p:blipFill rotWithShape="1">
-            <a:blip r:embed="rId17">
+            <a:blip r:embed="rId16">
               <a:extLst>
                 <a:ext uri="{28A0092B-C50C-407E-A947-70E740481C1C}">
                   <a14:useLocalDpi xmlns:a14="http://schemas.microsoft.com/office/drawing/2010/main" val="0"/>
@@ -9215,7 +9265,7 @@
             </a:ln>
             <a:extLst>
               <a:ext uri="{C572A759-6A51-4108-AA02-DFA0A04FC94B}">
-                <ma14:wrappingTextBoxFlag xmlns="" xmlns:m="http://schemas.openxmlformats.org/officeDocument/2006/math" xmlns:a14="http://schemas.microsoft.com/office/drawing/2010/main" xmlns:ma14="http://schemas.microsoft.com/office/mac/drawingml/2011/main" val="1"/>
+                <ma14:wrappingTextBoxFlag xmlns:ma14="http://schemas.microsoft.com/office/mac/drawingml/2011/main" xmlns:a14="http://schemas.microsoft.com/office/drawing/2010/main" xmlns:m="http://schemas.openxmlformats.org/officeDocument/2006/math" xmlns="" val="1"/>
               </a:ext>
             </a:extLst>
           </p:spPr>
@@ -9477,7 +9527,7 @@
             <a:effectLst/>
             <a:extLst>
               <a:ext uri="{C572A759-6A51-4108-AA02-DFA0A04FC94B}">
-                <ma14:wrappingTextBoxFlag xmlns="" xmlns:m="http://schemas.openxmlformats.org/officeDocument/2006/math" xmlns:a14="http://schemas.microsoft.com/office/drawing/2010/main" xmlns:ma14="http://schemas.microsoft.com/office/mac/drawingml/2011/main" val="1"/>
+                <ma14:wrappingTextBoxFlag xmlns:ma14="http://schemas.microsoft.com/office/mac/drawingml/2011/main" xmlns:a14="http://schemas.microsoft.com/office/drawing/2010/main" xmlns:m="http://schemas.openxmlformats.org/officeDocument/2006/math" xmlns="" val="1"/>
               </a:ext>
             </a:extLst>
           </p:spPr>
@@ -9576,7 +9626,7 @@
             <p:nvPr/>
           </p:nvPicPr>
           <p:blipFill rotWithShape="1">
-            <a:blip r:embed="rId18">
+            <a:blip r:embed="rId17">
               <a:extLst>
                 <a:ext uri="{28A0092B-C50C-407E-A947-70E740481C1C}">
                   <a14:useLocalDpi xmlns:a14="http://schemas.microsoft.com/office/drawing/2010/main" val="0"/>
@@ -9602,7 +9652,7 @@
             </a:ln>
             <a:extLst>
               <a:ext uri="{C572A759-6A51-4108-AA02-DFA0A04FC94B}">
-                <ma14:wrappingTextBoxFlag xmlns="" xmlns:m="http://schemas.openxmlformats.org/officeDocument/2006/math" xmlns:a14="http://schemas.microsoft.com/office/drawing/2010/main" xmlns:ma14="http://schemas.microsoft.com/office/mac/drawingml/2011/main" val="1"/>
+                <ma14:wrappingTextBoxFlag xmlns:ma14="http://schemas.microsoft.com/office/mac/drawingml/2011/main" xmlns:a14="http://schemas.microsoft.com/office/drawing/2010/main" xmlns:m="http://schemas.openxmlformats.org/officeDocument/2006/math" xmlns="" val="1"/>
               </a:ext>
             </a:extLst>
           </p:spPr>
@@ -9864,7 +9914,7 @@
             <a:effectLst/>
             <a:extLst>
               <a:ext uri="{C572A759-6A51-4108-AA02-DFA0A04FC94B}">
-                <ma14:wrappingTextBoxFlag xmlns="" xmlns:m="http://schemas.openxmlformats.org/officeDocument/2006/math" xmlns:a14="http://schemas.microsoft.com/office/drawing/2010/main" xmlns:ma14="http://schemas.microsoft.com/office/mac/drawingml/2011/main" val="1"/>
+                <ma14:wrappingTextBoxFlag xmlns:ma14="http://schemas.microsoft.com/office/mac/drawingml/2011/main" xmlns:a14="http://schemas.microsoft.com/office/drawing/2010/main" xmlns:m="http://schemas.openxmlformats.org/officeDocument/2006/math" xmlns="" val="1"/>
               </a:ext>
             </a:extLst>
           </p:spPr>
@@ -9963,7 +10013,7 @@
             <p:nvPr/>
           </p:nvPicPr>
           <p:blipFill rotWithShape="1">
-            <a:blip r:embed="rId19" cstate="print">
+            <a:blip r:embed="rId18" cstate="print">
               <a:extLst>
                 <a:ext uri="{28A0092B-C50C-407E-A947-70E740481C1C}">
                   <a14:useLocalDpi xmlns:a14="http://schemas.microsoft.com/office/drawing/2010/main" val="0"/>
@@ -9989,7 +10039,7 @@
             </a:ln>
             <a:extLst>
               <a:ext uri="{C572A759-6A51-4108-AA02-DFA0A04FC94B}">
-                <ma14:wrappingTextBoxFlag xmlns="" xmlns:m="http://schemas.openxmlformats.org/officeDocument/2006/math" xmlns:a14="http://schemas.microsoft.com/office/drawing/2010/main" xmlns:ma14="http://schemas.microsoft.com/office/mac/drawingml/2011/main" val="1"/>
+                <ma14:wrappingTextBoxFlag xmlns:ma14="http://schemas.microsoft.com/office/mac/drawingml/2011/main" xmlns:a14="http://schemas.microsoft.com/office/drawing/2010/main" xmlns:m="http://schemas.openxmlformats.org/officeDocument/2006/math" xmlns="" val="1"/>
               </a:ext>
             </a:extLst>
           </p:spPr>
@@ -10233,7 +10283,7 @@
           <a:effectLst/>
           <a:extLst>
             <a:ext uri="{C572A759-6A51-4108-AA02-DFA0A04FC94B}">
-              <ma14:wrappingTextBoxFlag xmlns="" xmlns:m="http://schemas.openxmlformats.org/officeDocument/2006/math" xmlns:a14="http://schemas.microsoft.com/office/drawing/2010/main" xmlns:ma14="http://schemas.microsoft.com/office/mac/drawingml/2011/main" val="1"/>
+              <ma14:wrappingTextBoxFlag xmlns:ma14="http://schemas.microsoft.com/office/mac/drawingml/2011/main" xmlns:a14="http://schemas.microsoft.com/office/drawing/2010/main" xmlns:m="http://schemas.openxmlformats.org/officeDocument/2006/math" xmlns="" val="1"/>
             </a:ext>
           </a:extLst>
         </p:spPr>
@@ -10330,7 +10380,7 @@
           <p:nvPr/>
         </p:nvPicPr>
         <p:blipFill rotWithShape="1">
-          <a:blip r:embed="rId20"/>
+          <a:blip r:embed="rId19"/>
           <a:srcRect t="992" b="992"/>
           <a:stretch/>
         </p:blipFill>
@@ -10350,7 +10400,7 @@
           </a:ln>
           <a:extLst>
             <a:ext uri="{C572A759-6A51-4108-AA02-DFA0A04FC94B}">
-              <ma14:wrappingTextBoxFlag xmlns="" xmlns:m="http://schemas.openxmlformats.org/officeDocument/2006/math" xmlns:a14="http://schemas.microsoft.com/office/drawing/2010/main" xmlns:ma14="http://schemas.microsoft.com/office/mac/drawingml/2011/main" val="1"/>
+              <ma14:wrappingTextBoxFlag xmlns:ma14="http://schemas.microsoft.com/office/mac/drawingml/2011/main" xmlns:a14="http://schemas.microsoft.com/office/drawing/2010/main" xmlns:m="http://schemas.openxmlformats.org/officeDocument/2006/math" xmlns="" val="1"/>
             </a:ext>
           </a:extLst>
         </p:spPr>
@@ -10541,7 +10591,7 @@
           <p:nvPr/>
         </p:nvPicPr>
         <p:blipFill rotWithShape="1">
-          <a:blip r:embed="rId21">
+          <a:blip r:embed="rId20">
             <a:extLst>
               <a:ext uri="{28A0092B-C50C-407E-A947-70E740481C1C}">
                 <a14:useLocalDpi xmlns:a14="http://schemas.microsoft.com/office/drawing/2010/main" val="0"/>
@@ -10567,7 +10617,7 @@
           </a:ln>
           <a:extLst>
             <a:ext uri="{C572A759-6A51-4108-AA02-DFA0A04FC94B}">
-              <ma14:wrappingTextBoxFlag xmlns="" xmlns:m="http://schemas.openxmlformats.org/officeDocument/2006/math" xmlns:a14="http://schemas.microsoft.com/office/drawing/2010/main" xmlns:ma14="http://schemas.microsoft.com/office/mac/drawingml/2011/main" val="1"/>
+              <ma14:wrappingTextBoxFlag xmlns:ma14="http://schemas.microsoft.com/office/mac/drawingml/2011/main" xmlns:a14="http://schemas.microsoft.com/office/drawing/2010/main" xmlns:m="http://schemas.openxmlformats.org/officeDocument/2006/math" xmlns="" val="1"/>
             </a:ext>
           </a:extLst>
         </p:spPr>
@@ -10850,7 +10900,7 @@
           <a:effectLst/>
           <a:extLst>
             <a:ext uri="{C572A759-6A51-4108-AA02-DFA0A04FC94B}">
-              <ma14:wrappingTextBoxFlag xmlns="" xmlns:m="http://schemas.openxmlformats.org/officeDocument/2006/math" xmlns:a14="http://schemas.microsoft.com/office/drawing/2010/main" xmlns:ma14="http://schemas.microsoft.com/office/mac/drawingml/2011/main" val="1"/>
+              <ma14:wrappingTextBoxFlag xmlns:ma14="http://schemas.microsoft.com/office/mac/drawingml/2011/main" xmlns:a14="http://schemas.microsoft.com/office/drawing/2010/main" xmlns:m="http://schemas.openxmlformats.org/officeDocument/2006/math" xmlns="" val="1"/>
             </a:ext>
           </a:extLst>
         </p:spPr>
@@ -10949,7 +10999,7 @@
           <p:nvPr/>
         </p:nvPicPr>
         <p:blipFill rotWithShape="1">
-          <a:blip r:embed="rId22">
+          <a:blip r:embed="rId21">
             <a:extLst>
               <a:ext uri="{28A0092B-C50C-407E-A947-70E740481C1C}">
                 <a14:useLocalDpi xmlns:a14="http://schemas.microsoft.com/office/drawing/2010/main" val="0"/>
@@ -10975,7 +11025,7 @@
           </a:ln>
           <a:extLst>
             <a:ext uri="{C572A759-6A51-4108-AA02-DFA0A04FC94B}">
-              <ma14:wrappingTextBoxFlag xmlns="" xmlns:m="http://schemas.openxmlformats.org/officeDocument/2006/math" xmlns:a14="http://schemas.microsoft.com/office/drawing/2010/main" xmlns:ma14="http://schemas.microsoft.com/office/mac/drawingml/2011/main" val="1"/>
+              <ma14:wrappingTextBoxFlag xmlns:ma14="http://schemas.microsoft.com/office/mac/drawingml/2011/main" xmlns:a14="http://schemas.microsoft.com/office/drawing/2010/main" xmlns:m="http://schemas.openxmlformats.org/officeDocument/2006/math" xmlns="" val="1"/>
             </a:ext>
           </a:extLst>
         </p:spPr>
@@ -11218,7 +11268,7 @@
           <a:effectLst/>
           <a:extLst>
             <a:ext uri="{C572A759-6A51-4108-AA02-DFA0A04FC94B}">
-              <ma14:wrappingTextBoxFlag xmlns="" xmlns:m="http://schemas.openxmlformats.org/officeDocument/2006/math" xmlns:a14="http://schemas.microsoft.com/office/drawing/2010/main" xmlns:ma14="http://schemas.microsoft.com/office/mac/drawingml/2011/main" val="1"/>
+              <ma14:wrappingTextBoxFlag xmlns:ma14="http://schemas.microsoft.com/office/mac/drawingml/2011/main" xmlns:a14="http://schemas.microsoft.com/office/drawing/2010/main" xmlns:m="http://schemas.openxmlformats.org/officeDocument/2006/math" xmlns="" val="1"/>
             </a:ext>
           </a:extLst>
         </p:spPr>
@@ -11315,7 +11365,7 @@
           <p:nvPr/>
         </p:nvPicPr>
         <p:blipFill rotWithShape="1">
-          <a:blip r:embed="rId23">
+          <a:blip r:embed="rId22">
             <a:extLst>
               <a:ext uri="{28A0092B-C50C-407E-A947-70E740481C1C}">
                 <a14:useLocalDpi xmlns:a14="http://schemas.microsoft.com/office/drawing/2010/main" val="0"/>
@@ -11341,7 +11391,7 @@
           </a:ln>
           <a:extLst>
             <a:ext uri="{C572A759-6A51-4108-AA02-DFA0A04FC94B}">
-              <ma14:wrappingTextBoxFlag xmlns="" xmlns:m="http://schemas.openxmlformats.org/officeDocument/2006/math" xmlns:a14="http://schemas.microsoft.com/office/drawing/2010/main" xmlns:ma14="http://schemas.microsoft.com/office/mac/drawingml/2011/main" val="1"/>
+              <ma14:wrappingTextBoxFlag xmlns:ma14="http://schemas.microsoft.com/office/mac/drawingml/2011/main" xmlns:a14="http://schemas.microsoft.com/office/drawing/2010/main" xmlns:m="http://schemas.openxmlformats.org/officeDocument/2006/math" xmlns="" val="1"/>
             </a:ext>
           </a:extLst>
         </p:spPr>
@@ -11684,7 +11734,7 @@
           <a:effectLst/>
           <a:extLst>
             <a:ext uri="{C572A759-6A51-4108-AA02-DFA0A04FC94B}">
-              <ma14:wrappingTextBoxFlag xmlns="" xmlns:m="http://schemas.openxmlformats.org/officeDocument/2006/math" xmlns:a14="http://schemas.microsoft.com/office/drawing/2010/main" xmlns:ma14="http://schemas.microsoft.com/office/mac/drawingml/2011/main" val="1"/>
+              <ma14:wrappingTextBoxFlag xmlns:ma14="http://schemas.microsoft.com/office/mac/drawingml/2011/main" xmlns:a14="http://schemas.microsoft.com/office/drawing/2010/main" xmlns:m="http://schemas.openxmlformats.org/officeDocument/2006/math" xmlns="" val="1"/>
             </a:ext>
           </a:extLst>
         </p:spPr>
@@ -12005,7 +12055,7 @@
           <a:effectLst/>
           <a:extLst>
             <a:ext uri="{C572A759-6A51-4108-AA02-DFA0A04FC94B}">
-              <ma14:wrappingTextBoxFlag xmlns="" xmlns:m="http://schemas.openxmlformats.org/officeDocument/2006/math" xmlns:a14="http://schemas.microsoft.com/office/drawing/2010/main" xmlns:ma14="http://schemas.microsoft.com/office/mac/drawingml/2011/main" val="1"/>
+              <ma14:wrappingTextBoxFlag xmlns:ma14="http://schemas.microsoft.com/office/mac/drawingml/2011/main" xmlns:a14="http://schemas.microsoft.com/office/drawing/2010/main" xmlns:m="http://schemas.openxmlformats.org/officeDocument/2006/math" xmlns="" val="1"/>
             </a:ext>
           </a:extLst>
         </p:spPr>
@@ -12029,13 +12079,13 @@
           <a:p>
             <a:r>
               <a:rPr lang="fr-FR" dirty="0"/>
-              <a:t>Rowa</a:t>
+              <a:t>TBD</a:t>
             </a:r>
           </a:p>
           <a:p>
             <a:r>
               <a:rPr lang="fr-FR" sz="2000" dirty="0"/>
-              <a:t>Corp. recruitment</a:t>
+              <a:t>Corp. Recruitment</a:t>
             </a:r>
             <a:endParaRPr sz="2000" dirty="0"/>
           </a:p>
@@ -12076,6 +12126,17 @@
           </a:bodyPr>
           <a:lstStyle/>
           <a:p>
+            <a:r>
+              <a:rPr lang="en-US" sz="3200" b="0" dirty="0">
+                <a:solidFill>
+                  <a:srgbClr val="FFFFFF"/>
+                </a:solidFill>
+                <a:latin typeface="+mn-lt"/>
+                <a:ea typeface="+mn-ea"/>
+                <a:cs typeface="+mn-cs"/>
+              </a:rPr>
+              <a:t>?</a:t>
+            </a:r>
             <a:endParaRPr sz="3200" b="0" dirty="0">
               <a:solidFill>
                 <a:srgbClr val="FFFFFF"/>
@@ -12102,7 +12163,7 @@
           <p:nvPr/>
         </p:nvPicPr>
         <p:blipFill rotWithShape="1">
-          <a:blip r:embed="rId24">
+          <a:blip r:embed="rId23">
             <a:extLst>
               <a:ext uri="{28A0092B-C50C-407E-A947-70E740481C1C}">
                 <a14:useLocalDpi xmlns:a14="http://schemas.microsoft.com/office/drawing/2010/main" val="0"/>
@@ -12128,53 +12189,7 @@
           </a:ln>
           <a:extLst>
             <a:ext uri="{C572A759-6A51-4108-AA02-DFA0A04FC94B}">
-              <ma14:wrappingTextBoxFlag xmlns="" xmlns:m="http://schemas.openxmlformats.org/officeDocument/2006/math" xmlns:a14="http://schemas.microsoft.com/office/drawing/2010/main" xmlns:ma14="http://schemas.microsoft.com/office/mac/drawingml/2011/main" val="1"/>
-            </a:ext>
-          </a:extLst>
-        </p:spPr>
-      </p:pic>
-      <p:pic>
-        <p:nvPicPr>
-          <p:cNvPr id="200" name="Espace réservé pour une image  15">
-            <a:extLst>
-              <a:ext uri="{FF2B5EF4-FFF2-40B4-BE49-F238E27FC236}">
-                <a16:creationId xmlns:a16="http://schemas.microsoft.com/office/drawing/2014/main" id="{5026E8E9-6A2C-4E14-B660-D1A2D6C220DA}"/>
-              </a:ext>
-            </a:extLst>
-          </p:cNvPr>
-          <p:cNvPicPr>
-            <a:picLocks noChangeAspect="1"/>
-          </p:cNvPicPr>
-          <p:nvPr/>
-        </p:nvPicPr>
-        <p:blipFill rotWithShape="1">
-          <a:blip r:embed="rId25" cstate="print">
-            <a:extLst>
-              <a:ext uri="{28A0092B-C50C-407E-A947-70E740481C1C}">
-                <a14:useLocalDpi xmlns:a14="http://schemas.microsoft.com/office/drawing/2010/main" val="0"/>
-              </a:ext>
-            </a:extLst>
-          </a:blip>
-          <a:srcRect l="984" r="984"/>
-          <a:stretch/>
-        </p:blipFill>
-        <p:spPr>
-          <a:xfrm>
-            <a:off x="20399447" y="4002045"/>
-            <a:ext cx="788516" cy="788516"/>
-          </a:xfrm>
-          <a:prstGeom prst="ellipse">
-            <a:avLst/>
-          </a:prstGeom>
-          <a:solidFill>
-            <a:srgbClr val="ECECEC"/>
-          </a:solidFill>
-          <a:ln w="12700">
-            <a:miter lim="400000"/>
-          </a:ln>
-          <a:extLst>
-            <a:ext uri="{C572A759-6A51-4108-AA02-DFA0A04FC94B}">
-              <ma14:wrappingTextBoxFlag xmlns="" xmlns:m="http://schemas.openxmlformats.org/officeDocument/2006/math" xmlns:a14="http://schemas.microsoft.com/office/drawing/2010/main" xmlns:ma14="http://schemas.microsoft.com/office/mac/drawingml/2011/main" val="1"/>
+              <ma14:wrappingTextBoxFlag xmlns:ma14="http://schemas.microsoft.com/office/mac/drawingml/2011/main" xmlns:a14="http://schemas.microsoft.com/office/drawing/2010/main" xmlns:m="http://schemas.openxmlformats.org/officeDocument/2006/math" xmlns="" val="1"/>
             </a:ext>
           </a:extLst>
         </p:spPr>
@@ -12417,7 +12432,7 @@
           <a:effectLst/>
           <a:extLst>
             <a:ext uri="{C572A759-6A51-4108-AA02-DFA0A04FC94B}">
-              <ma14:wrappingTextBoxFlag xmlns="" xmlns:m="http://schemas.openxmlformats.org/officeDocument/2006/math" xmlns:a14="http://schemas.microsoft.com/office/drawing/2010/main" xmlns:ma14="http://schemas.microsoft.com/office/mac/drawingml/2011/main" val="1"/>
+              <ma14:wrappingTextBoxFlag xmlns:ma14="http://schemas.microsoft.com/office/mac/drawingml/2011/main" xmlns:a14="http://schemas.microsoft.com/office/drawing/2010/main" xmlns:m="http://schemas.openxmlformats.org/officeDocument/2006/math" xmlns="" val="1"/>
             </a:ext>
           </a:extLst>
         </p:spPr>
@@ -12514,7 +12529,7 @@
           <p:nvPr/>
         </p:nvPicPr>
         <p:blipFill rotWithShape="1">
-          <a:blip r:embed="rId26">
+          <a:blip r:embed="rId24">
             <a:extLst>
               <a:ext uri="{28A0092B-C50C-407E-A947-70E740481C1C}">
                 <a14:useLocalDpi xmlns:a14="http://schemas.microsoft.com/office/drawing/2010/main" val="0"/>
@@ -12540,7 +12555,7 @@
           </a:ln>
           <a:extLst>
             <a:ext uri="{C572A759-6A51-4108-AA02-DFA0A04FC94B}">
-              <ma14:wrappingTextBoxFlag xmlns="" xmlns:m="http://schemas.openxmlformats.org/officeDocument/2006/math" xmlns:a14="http://schemas.microsoft.com/office/drawing/2010/main" xmlns:ma14="http://schemas.microsoft.com/office/mac/drawingml/2011/main" val="1"/>
+              <ma14:wrappingTextBoxFlag xmlns:ma14="http://schemas.microsoft.com/office/mac/drawingml/2011/main" xmlns:a14="http://schemas.microsoft.com/office/drawing/2010/main" xmlns:m="http://schemas.openxmlformats.org/officeDocument/2006/math" xmlns="" val="1"/>
             </a:ext>
           </a:extLst>
         </p:spPr>

</xml_diff>

<commit_message>
Changed Aspect Ratio of Leadership Image
</commit_message>
<xml_diff>
--- a/images/alliance-leadership/Brave-Leadership.pptx
+++ b/images/alliance-leadership/Brave-Leadership.pptx
@@ -10,10 +10,10 @@
   <p:sldIdLst>
     <p:sldId id="326" r:id="rId2"/>
   </p:sldIdLst>
-  <p:sldSz cx="24384000" cy="13716000"/>
+  <p:sldSz cx="27432000" cy="16287750"/>
   <p:notesSz cx="6858000" cy="9144000"/>
   <p:defaultTextStyle>
-    <a:defPPr marL="0" marR="0" indent="0" algn="l" defTabSz="914400" rtl="0" fontAlgn="auto" latinLnBrk="1" hangingPunct="0">
+    <a:defPPr marL="0" marR="0" indent="0" algn="l" defTabSz="1049274" rtl="0" fontAlgn="auto" latinLnBrk="1" hangingPunct="0">
       <a:lnSpc>
         <a:spcPct val="100000"/>
       </a:lnSpc>
@@ -28,7 +28,7 @@
       <a:buFontTx/>
       <a:buNone/>
       <a:tabLst/>
-      <a:defRPr kumimoji="0" sz="1800" b="0" i="0" u="none" strike="noStrike" cap="none" spc="0" normalizeH="0" baseline="0">
+      <a:defRPr kumimoji="0" sz="2066" b="0" i="0" u="none" strike="noStrike" cap="none" spc="0" normalizeH="0" baseline="0">
         <a:ln>
           <a:noFill/>
         </a:ln>
@@ -39,7 +39,7 @@
         <a:uFillTx/>
       </a:defRPr>
     </a:defPPr>
-    <a:lvl1pPr marL="0" marR="0" indent="0" algn="ctr" defTabSz="825500" rtl="0" fontAlgn="auto" latinLnBrk="0" hangingPunct="0">
+    <a:lvl1pPr marL="0" marR="0" indent="0" algn="ctr" defTabSz="947261" rtl="0" fontAlgn="auto" latinLnBrk="0" hangingPunct="0">
       <a:lnSpc>
         <a:spcPct val="100000"/>
       </a:lnSpc>
@@ -54,7 +54,7 @@
       <a:buFontTx/>
       <a:buNone/>
       <a:tabLst/>
-      <a:defRPr kumimoji="0" sz="3000" b="1" i="0" u="none" strike="noStrike" cap="none" spc="0" normalizeH="0" baseline="0">
+      <a:defRPr kumimoji="0" sz="3442" b="1" i="0" u="none" strike="noStrike" cap="none" spc="0" normalizeH="0" baseline="0">
         <a:ln>
           <a:noFill/>
         </a:ln>
@@ -69,7 +69,7 @@
         <a:sym typeface="Helvetica Neue"/>
       </a:defRPr>
     </a:lvl1pPr>
-    <a:lvl2pPr marL="0" marR="0" indent="228600" algn="ctr" defTabSz="825500" rtl="0" fontAlgn="auto" latinLnBrk="0" hangingPunct="0">
+    <a:lvl2pPr marL="0" marR="0" indent="262319" algn="ctr" defTabSz="947261" rtl="0" fontAlgn="auto" latinLnBrk="0" hangingPunct="0">
       <a:lnSpc>
         <a:spcPct val="100000"/>
       </a:lnSpc>
@@ -84,7 +84,7 @@
       <a:buFontTx/>
       <a:buNone/>
       <a:tabLst/>
-      <a:defRPr kumimoji="0" sz="3000" b="1" i="0" u="none" strike="noStrike" cap="none" spc="0" normalizeH="0" baseline="0">
+      <a:defRPr kumimoji="0" sz="3442" b="1" i="0" u="none" strike="noStrike" cap="none" spc="0" normalizeH="0" baseline="0">
         <a:ln>
           <a:noFill/>
         </a:ln>
@@ -99,7 +99,7 @@
         <a:sym typeface="Helvetica Neue"/>
       </a:defRPr>
     </a:lvl2pPr>
-    <a:lvl3pPr marL="0" marR="0" indent="457200" algn="ctr" defTabSz="825500" rtl="0" fontAlgn="auto" latinLnBrk="0" hangingPunct="0">
+    <a:lvl3pPr marL="0" marR="0" indent="524637" algn="ctr" defTabSz="947261" rtl="0" fontAlgn="auto" latinLnBrk="0" hangingPunct="0">
       <a:lnSpc>
         <a:spcPct val="100000"/>
       </a:lnSpc>
@@ -114,7 +114,7 @@
       <a:buFontTx/>
       <a:buNone/>
       <a:tabLst/>
-      <a:defRPr kumimoji="0" sz="3000" b="1" i="0" u="none" strike="noStrike" cap="none" spc="0" normalizeH="0" baseline="0">
+      <a:defRPr kumimoji="0" sz="3442" b="1" i="0" u="none" strike="noStrike" cap="none" spc="0" normalizeH="0" baseline="0">
         <a:ln>
           <a:noFill/>
         </a:ln>
@@ -129,7 +129,7 @@
         <a:sym typeface="Helvetica Neue"/>
       </a:defRPr>
     </a:lvl3pPr>
-    <a:lvl4pPr marL="0" marR="0" indent="685800" algn="ctr" defTabSz="825500" rtl="0" fontAlgn="auto" latinLnBrk="0" hangingPunct="0">
+    <a:lvl4pPr marL="0" marR="0" indent="786956" algn="ctr" defTabSz="947261" rtl="0" fontAlgn="auto" latinLnBrk="0" hangingPunct="0">
       <a:lnSpc>
         <a:spcPct val="100000"/>
       </a:lnSpc>
@@ -144,7 +144,7 @@
       <a:buFontTx/>
       <a:buNone/>
       <a:tabLst/>
-      <a:defRPr kumimoji="0" sz="3000" b="1" i="0" u="none" strike="noStrike" cap="none" spc="0" normalizeH="0" baseline="0">
+      <a:defRPr kumimoji="0" sz="3442" b="1" i="0" u="none" strike="noStrike" cap="none" spc="0" normalizeH="0" baseline="0">
         <a:ln>
           <a:noFill/>
         </a:ln>
@@ -159,7 +159,7 @@
         <a:sym typeface="Helvetica Neue"/>
       </a:defRPr>
     </a:lvl4pPr>
-    <a:lvl5pPr marL="0" marR="0" indent="914400" algn="ctr" defTabSz="825500" rtl="0" fontAlgn="auto" latinLnBrk="0" hangingPunct="0">
+    <a:lvl5pPr marL="0" marR="0" indent="1049274" algn="ctr" defTabSz="947261" rtl="0" fontAlgn="auto" latinLnBrk="0" hangingPunct="0">
       <a:lnSpc>
         <a:spcPct val="100000"/>
       </a:lnSpc>
@@ -174,7 +174,7 @@
       <a:buFontTx/>
       <a:buNone/>
       <a:tabLst/>
-      <a:defRPr kumimoji="0" sz="3000" b="1" i="0" u="none" strike="noStrike" cap="none" spc="0" normalizeH="0" baseline="0">
+      <a:defRPr kumimoji="0" sz="3442" b="1" i="0" u="none" strike="noStrike" cap="none" spc="0" normalizeH="0" baseline="0">
         <a:ln>
           <a:noFill/>
         </a:ln>
@@ -189,7 +189,7 @@
         <a:sym typeface="Helvetica Neue"/>
       </a:defRPr>
     </a:lvl5pPr>
-    <a:lvl6pPr marL="0" marR="0" indent="1143000" algn="ctr" defTabSz="825500" rtl="0" fontAlgn="auto" latinLnBrk="0" hangingPunct="0">
+    <a:lvl6pPr marL="0" marR="0" indent="1311593" algn="ctr" defTabSz="947261" rtl="0" fontAlgn="auto" latinLnBrk="0" hangingPunct="0">
       <a:lnSpc>
         <a:spcPct val="100000"/>
       </a:lnSpc>
@@ -204,7 +204,7 @@
       <a:buFontTx/>
       <a:buNone/>
       <a:tabLst/>
-      <a:defRPr kumimoji="0" sz="3000" b="1" i="0" u="none" strike="noStrike" cap="none" spc="0" normalizeH="0" baseline="0">
+      <a:defRPr kumimoji="0" sz="3442" b="1" i="0" u="none" strike="noStrike" cap="none" spc="0" normalizeH="0" baseline="0">
         <a:ln>
           <a:noFill/>
         </a:ln>
@@ -219,7 +219,7 @@
         <a:sym typeface="Helvetica Neue"/>
       </a:defRPr>
     </a:lvl6pPr>
-    <a:lvl7pPr marL="0" marR="0" indent="1371600" algn="ctr" defTabSz="825500" rtl="0" fontAlgn="auto" latinLnBrk="0" hangingPunct="0">
+    <a:lvl7pPr marL="0" marR="0" indent="1573911" algn="ctr" defTabSz="947261" rtl="0" fontAlgn="auto" latinLnBrk="0" hangingPunct="0">
       <a:lnSpc>
         <a:spcPct val="100000"/>
       </a:lnSpc>
@@ -234,7 +234,7 @@
       <a:buFontTx/>
       <a:buNone/>
       <a:tabLst/>
-      <a:defRPr kumimoji="0" sz="3000" b="1" i="0" u="none" strike="noStrike" cap="none" spc="0" normalizeH="0" baseline="0">
+      <a:defRPr kumimoji="0" sz="3442" b="1" i="0" u="none" strike="noStrike" cap="none" spc="0" normalizeH="0" baseline="0">
         <a:ln>
           <a:noFill/>
         </a:ln>
@@ -249,7 +249,7 @@
         <a:sym typeface="Helvetica Neue"/>
       </a:defRPr>
     </a:lvl7pPr>
-    <a:lvl8pPr marL="0" marR="0" indent="1600200" algn="ctr" defTabSz="825500" rtl="0" fontAlgn="auto" latinLnBrk="0" hangingPunct="0">
+    <a:lvl8pPr marL="0" marR="0" indent="1836230" algn="ctr" defTabSz="947261" rtl="0" fontAlgn="auto" latinLnBrk="0" hangingPunct="0">
       <a:lnSpc>
         <a:spcPct val="100000"/>
       </a:lnSpc>
@@ -264,7 +264,7 @@
       <a:buFontTx/>
       <a:buNone/>
       <a:tabLst/>
-      <a:defRPr kumimoji="0" sz="3000" b="1" i="0" u="none" strike="noStrike" cap="none" spc="0" normalizeH="0" baseline="0">
+      <a:defRPr kumimoji="0" sz="3442" b="1" i="0" u="none" strike="noStrike" cap="none" spc="0" normalizeH="0" baseline="0">
         <a:ln>
           <a:noFill/>
         </a:ln>
@@ -279,7 +279,7 @@
         <a:sym typeface="Helvetica Neue"/>
       </a:defRPr>
     </a:lvl8pPr>
-    <a:lvl9pPr marL="0" marR="0" indent="1828800" algn="ctr" defTabSz="825500" rtl="0" fontAlgn="auto" latinLnBrk="0" hangingPunct="0">
+    <a:lvl9pPr marL="0" marR="0" indent="2098548" algn="ctr" defTabSz="947261" rtl="0" fontAlgn="auto" latinLnBrk="0" hangingPunct="0">
       <a:lnSpc>
         <a:spcPct val="100000"/>
       </a:lnSpc>
@@ -294,7 +294,7 @@
       <a:buFontTx/>
       <a:buNone/>
       <a:tabLst/>
-      <a:defRPr kumimoji="0" sz="3000" b="1" i="0" u="none" strike="noStrike" cap="none" spc="0" normalizeH="0" baseline="0">
+      <a:defRPr kumimoji="0" sz="3442" b="1" i="0" u="none" strike="noStrike" cap="none" spc="0" normalizeH="0" baseline="0">
         <a:ln>
           <a:noFill/>
         </a:ln>
@@ -334,12 +334,37 @@
 <p1510:revInfo xmlns:a="http://schemas.openxmlformats.org/drawingml/2006/main" xmlns:r="http://schemas.openxmlformats.org/officeDocument/2006/relationships" xmlns:p1510="http://schemas.microsoft.com/office/powerpoint/2015/10/main">
   <p1510:revLst>
     <p1510:client id="{0CD06005-BE02-46D1-B07A-48E42C56809F}" v="5" dt="2021-11-29T23:04:16.369"/>
+    <p1510:client id="{4BE024F7-1545-4B72-AEEC-C0F382AEBC24}" v="1" dt="2021-11-30T22:07:32.014"/>
   </p1510:revLst>
 </p1510:revInfo>
 </file>
 
 <file path=ppt/changesInfos/changesInfo1.xml><?xml version="1.0" encoding="utf-8"?>
 <pc:chgInfo xmlns:a="http://schemas.openxmlformats.org/drawingml/2006/main" xmlns:r="http://schemas.openxmlformats.org/officeDocument/2006/relationships" xmlns:ac="http://schemas.microsoft.com/office/drawing/2013/main/command" xmlns:pc="http://schemas.microsoft.com/office/powerpoint/2013/main/command">
+  <pc:docChgLst>
+    <pc:chgData name="Aiden Jepson" userId="27ac3319768fac1a" providerId="LiveId" clId="{4BE024F7-1545-4B72-AEEC-C0F382AEBC24}"/>
+    <pc:docChg chg="modSld">
+      <pc:chgData name="Aiden Jepson" userId="27ac3319768fac1a" providerId="LiveId" clId="{4BE024F7-1545-4B72-AEEC-C0F382AEBC24}" dt="2021-11-30T22:07:41.724" v="1" actId="14100"/>
+      <pc:docMkLst>
+        <pc:docMk/>
+      </pc:docMkLst>
+      <pc:sldChg chg="modSp mod">
+        <pc:chgData name="Aiden Jepson" userId="27ac3319768fac1a" providerId="LiveId" clId="{4BE024F7-1545-4B72-AEEC-C0F382AEBC24}" dt="2021-11-30T22:07:41.724" v="1" actId="14100"/>
+        <pc:sldMkLst>
+          <pc:docMk/>
+          <pc:sldMk cId="180280424" sldId="326"/>
+        </pc:sldMkLst>
+        <pc:spChg chg="mod">
+          <ac:chgData name="Aiden Jepson" userId="27ac3319768fac1a" providerId="LiveId" clId="{4BE024F7-1545-4B72-AEEC-C0F382AEBC24}" dt="2021-11-30T22:07:41.724" v="1" actId="14100"/>
+          <ac:spMkLst>
+            <pc:docMk/>
+            <pc:sldMk cId="180280424" sldId="326"/>
+            <ac:spMk id="30" creationId="{E3629B67-1B57-496A-9A26-8F1CD79975FB}"/>
+          </ac:spMkLst>
+        </pc:spChg>
+      </pc:sldChg>
+    </pc:docChg>
+  </pc:docChgLst>
   <pc:docChgLst>
     <pc:chgData name="Aiden Jepson" userId="27ac3319768fac1a" providerId="LiveId" clId="{0CD06005-BE02-46D1-B07A-48E42C56809F}"/>
     <pc:docChg chg="undo redo custSel modSld">
@@ -449,8 +474,8 @@
         </p:nvSpPr>
         <p:spPr>
           <a:xfrm>
-            <a:off x="1143000" y="685800"/>
-            <a:ext cx="4572000" cy="3429000"/>
+            <a:off x="542925" y="685800"/>
+            <a:ext cx="5772150" cy="3429000"/>
           </a:xfrm>
           <a:prstGeom prst="rect">
             <a:avLst/>
@@ -495,99 +520,99 @@
   </p:cSld>
   <p:clrMap bg1="lt1" tx1="dk1" bg2="lt2" tx2="dk2" accent1="accent1" accent2="accent2" accent3="accent3" accent4="accent4" accent5="accent5" accent6="accent6" hlink="hlink" folHlink="folHlink"/>
   <p:notesStyle>
-    <a:lvl1pPr defTabSz="457200" latinLnBrk="0">
+    <a:lvl1pPr defTabSz="524637" latinLnBrk="0">
       <a:lnSpc>
         <a:spcPct val="117999"/>
       </a:lnSpc>
-      <a:defRPr sz="2200">
+      <a:defRPr sz="2525">
         <a:latin typeface="Helvetica Neue"/>
         <a:ea typeface="Helvetica Neue"/>
         <a:cs typeface="Helvetica Neue"/>
         <a:sym typeface="Helvetica Neue"/>
       </a:defRPr>
     </a:lvl1pPr>
-    <a:lvl2pPr indent="228600" defTabSz="457200" latinLnBrk="0">
+    <a:lvl2pPr indent="262319" defTabSz="524637" latinLnBrk="0">
       <a:lnSpc>
         <a:spcPct val="117999"/>
       </a:lnSpc>
-      <a:defRPr sz="2200">
+      <a:defRPr sz="2525">
         <a:latin typeface="Helvetica Neue"/>
         <a:ea typeface="Helvetica Neue"/>
         <a:cs typeface="Helvetica Neue"/>
         <a:sym typeface="Helvetica Neue"/>
       </a:defRPr>
     </a:lvl2pPr>
-    <a:lvl3pPr indent="457200" defTabSz="457200" latinLnBrk="0">
+    <a:lvl3pPr indent="524637" defTabSz="524637" latinLnBrk="0">
       <a:lnSpc>
         <a:spcPct val="117999"/>
       </a:lnSpc>
-      <a:defRPr sz="2200">
+      <a:defRPr sz="2525">
         <a:latin typeface="Helvetica Neue"/>
         <a:ea typeface="Helvetica Neue"/>
         <a:cs typeface="Helvetica Neue"/>
         <a:sym typeface="Helvetica Neue"/>
       </a:defRPr>
     </a:lvl3pPr>
-    <a:lvl4pPr indent="685800" defTabSz="457200" latinLnBrk="0">
+    <a:lvl4pPr indent="786956" defTabSz="524637" latinLnBrk="0">
       <a:lnSpc>
         <a:spcPct val="117999"/>
       </a:lnSpc>
-      <a:defRPr sz="2200">
+      <a:defRPr sz="2525">
         <a:latin typeface="Helvetica Neue"/>
         <a:ea typeface="Helvetica Neue"/>
         <a:cs typeface="Helvetica Neue"/>
         <a:sym typeface="Helvetica Neue"/>
       </a:defRPr>
     </a:lvl4pPr>
-    <a:lvl5pPr indent="914400" defTabSz="457200" latinLnBrk="0">
+    <a:lvl5pPr indent="1049274" defTabSz="524637" latinLnBrk="0">
       <a:lnSpc>
         <a:spcPct val="117999"/>
       </a:lnSpc>
-      <a:defRPr sz="2200">
+      <a:defRPr sz="2525">
         <a:latin typeface="Helvetica Neue"/>
         <a:ea typeface="Helvetica Neue"/>
         <a:cs typeface="Helvetica Neue"/>
         <a:sym typeface="Helvetica Neue"/>
       </a:defRPr>
     </a:lvl5pPr>
-    <a:lvl6pPr indent="1143000" defTabSz="457200" latinLnBrk="0">
+    <a:lvl6pPr indent="1311593" defTabSz="524637" latinLnBrk="0">
       <a:lnSpc>
         <a:spcPct val="117999"/>
       </a:lnSpc>
-      <a:defRPr sz="2200">
+      <a:defRPr sz="2525">
         <a:latin typeface="Helvetica Neue"/>
         <a:ea typeface="Helvetica Neue"/>
         <a:cs typeface="Helvetica Neue"/>
         <a:sym typeface="Helvetica Neue"/>
       </a:defRPr>
     </a:lvl6pPr>
-    <a:lvl7pPr indent="1371600" defTabSz="457200" latinLnBrk="0">
+    <a:lvl7pPr indent="1573911" defTabSz="524637" latinLnBrk="0">
       <a:lnSpc>
         <a:spcPct val="117999"/>
       </a:lnSpc>
-      <a:defRPr sz="2200">
+      <a:defRPr sz="2525">
         <a:latin typeface="Helvetica Neue"/>
         <a:ea typeface="Helvetica Neue"/>
         <a:cs typeface="Helvetica Neue"/>
         <a:sym typeface="Helvetica Neue"/>
       </a:defRPr>
     </a:lvl7pPr>
-    <a:lvl8pPr indent="1600200" defTabSz="457200" latinLnBrk="0">
+    <a:lvl8pPr indent="1836230" defTabSz="524637" latinLnBrk="0">
       <a:lnSpc>
         <a:spcPct val="117999"/>
       </a:lnSpc>
-      <a:defRPr sz="2200">
+      <a:defRPr sz="2525">
         <a:latin typeface="Helvetica Neue"/>
         <a:ea typeface="Helvetica Neue"/>
         <a:cs typeface="Helvetica Neue"/>
         <a:sym typeface="Helvetica Neue"/>
       </a:defRPr>
     </a:lvl8pPr>
-    <a:lvl9pPr indent="1828800" defTabSz="457200" latinLnBrk="0">
+    <a:lvl9pPr indent="2098548" defTabSz="524637" latinLnBrk="0">
       <a:lnSpc>
         <a:spcPct val="117999"/>
       </a:lnSpc>
-      <a:defRPr sz="2200">
+      <a:defRPr sz="2525">
         <a:latin typeface="Helvetica Neue"/>
         <a:ea typeface="Helvetica Neue"/>
         <a:cs typeface="Helvetica Neue"/>
@@ -627,8 +652,8 @@
         </p:nvSpPr>
         <p:spPr>
           <a:xfrm>
-            <a:off x="381000" y="685800"/>
-            <a:ext cx="6096000" cy="3429000"/>
+            <a:off x="541338" y="685800"/>
+            <a:ext cx="5775325" cy="3429000"/>
           </a:xfrm>
         </p:spPr>
       </p:sp>
@@ -735,8 +760,8 @@
         </p:nvSpPr>
         <p:spPr>
           <a:xfrm>
-            <a:off x="2077605" y="3076431"/>
-            <a:ext cx="1385888" cy="1384300"/>
+            <a:off x="2337306" y="3653262"/>
+            <a:ext cx="1559124" cy="1643856"/>
           </a:xfrm>
           <a:solidFill>
             <a:srgbClr val="ECECEC"/>
@@ -780,8 +805,8 @@
         </p:nvSpPr>
         <p:spPr>
           <a:xfrm>
-            <a:off x="4260466" y="3076431"/>
-            <a:ext cx="1385888" cy="1384300"/>
+            <a:off x="4793024" y="3653262"/>
+            <a:ext cx="1559124" cy="1643856"/>
           </a:xfrm>
           <a:solidFill>
             <a:srgbClr val="ECECEC"/>
@@ -825,8 +850,8 @@
         </p:nvSpPr>
         <p:spPr>
           <a:xfrm>
-            <a:off x="6443327" y="3076431"/>
-            <a:ext cx="1385888" cy="1384300"/>
+            <a:off x="7248743" y="3653262"/>
+            <a:ext cx="1559124" cy="1643856"/>
           </a:xfrm>
           <a:solidFill>
             <a:srgbClr val="ECECEC"/>
@@ -870,8 +895,8 @@
         </p:nvSpPr>
         <p:spPr>
           <a:xfrm>
-            <a:off x="8626188" y="3076431"/>
-            <a:ext cx="1385888" cy="1384300"/>
+            <a:off x="9704462" y="3653262"/>
+            <a:ext cx="1559124" cy="1643856"/>
           </a:xfrm>
           <a:solidFill>
             <a:srgbClr val="ECECEC"/>
@@ -915,8 +940,8 @@
         </p:nvSpPr>
         <p:spPr>
           <a:xfrm>
-            <a:off x="10809049" y="3076431"/>
-            <a:ext cx="1385888" cy="1384300"/>
+            <a:off x="12160180" y="3653262"/>
+            <a:ext cx="1559124" cy="1643856"/>
           </a:xfrm>
           <a:solidFill>
             <a:srgbClr val="ECECEC"/>
@@ -960,8 +985,8 @@
         </p:nvSpPr>
         <p:spPr>
           <a:xfrm>
-            <a:off x="12991910" y="3076431"/>
-            <a:ext cx="1385888" cy="1384300"/>
+            <a:off x="14615899" y="3653262"/>
+            <a:ext cx="1559124" cy="1643856"/>
           </a:xfrm>
           <a:solidFill>
             <a:srgbClr val="ECECEC"/>
@@ -1005,8 +1030,8 @@
         </p:nvSpPr>
         <p:spPr>
           <a:xfrm>
-            <a:off x="15174771" y="3076431"/>
-            <a:ext cx="1385888" cy="1384300"/>
+            <a:off x="17071617" y="3653262"/>
+            <a:ext cx="1559124" cy="1643856"/>
           </a:xfrm>
           <a:solidFill>
             <a:srgbClr val="ECECEC"/>
@@ -1050,8 +1075,8 @@
         </p:nvSpPr>
         <p:spPr>
           <a:xfrm>
-            <a:off x="17357632" y="3076431"/>
-            <a:ext cx="1385888" cy="1384300"/>
+            <a:off x="19527336" y="3653262"/>
+            <a:ext cx="1559124" cy="1643856"/>
           </a:xfrm>
           <a:solidFill>
             <a:srgbClr val="ECECEC"/>
@@ -1095,8 +1120,8 @@
         </p:nvSpPr>
         <p:spPr>
           <a:xfrm>
-            <a:off x="19540493" y="3076431"/>
-            <a:ext cx="1385888" cy="1384300"/>
+            <a:off x="21983055" y="3653262"/>
+            <a:ext cx="1559124" cy="1643856"/>
           </a:xfrm>
           <a:solidFill>
             <a:srgbClr val="ECECEC"/>
@@ -1140,8 +1165,8 @@
         </p:nvSpPr>
         <p:spPr>
           <a:xfrm>
-            <a:off x="21723351" y="3076431"/>
-            <a:ext cx="1385888" cy="1384300"/>
+            <a:off x="24438770" y="3653262"/>
+            <a:ext cx="1559124" cy="1643856"/>
           </a:xfrm>
           <a:solidFill>
             <a:srgbClr val="ECECEC"/>
@@ -1185,8 +1210,8 @@
         </p:nvSpPr>
         <p:spPr>
           <a:xfrm>
-            <a:off x="2077605" y="5071485"/>
-            <a:ext cx="1385888" cy="1384300"/>
+            <a:off x="2337306" y="6022389"/>
+            <a:ext cx="1559124" cy="1643856"/>
           </a:xfrm>
           <a:solidFill>
             <a:srgbClr val="ECECEC"/>
@@ -1230,8 +1255,8 @@
         </p:nvSpPr>
         <p:spPr>
           <a:xfrm>
-            <a:off x="4260466" y="5071485"/>
-            <a:ext cx="1385888" cy="1384300"/>
+            <a:off x="4793024" y="6022389"/>
+            <a:ext cx="1559124" cy="1643856"/>
           </a:xfrm>
           <a:solidFill>
             <a:srgbClr val="ECECEC"/>
@@ -1275,8 +1300,8 @@
         </p:nvSpPr>
         <p:spPr>
           <a:xfrm>
-            <a:off x="6443327" y="5071485"/>
-            <a:ext cx="1385888" cy="1384300"/>
+            <a:off x="7248743" y="6022389"/>
+            <a:ext cx="1559124" cy="1643856"/>
           </a:xfrm>
           <a:solidFill>
             <a:srgbClr val="ECECEC"/>
@@ -1320,8 +1345,8 @@
         </p:nvSpPr>
         <p:spPr>
           <a:xfrm>
-            <a:off x="8626188" y="5071485"/>
-            <a:ext cx="1385888" cy="1384300"/>
+            <a:off x="9704462" y="6022389"/>
+            <a:ext cx="1559124" cy="1643856"/>
           </a:xfrm>
           <a:solidFill>
             <a:srgbClr val="ECECEC"/>
@@ -1365,8 +1390,8 @@
         </p:nvSpPr>
         <p:spPr>
           <a:xfrm>
-            <a:off x="10809049" y="5071485"/>
-            <a:ext cx="1385888" cy="1384300"/>
+            <a:off x="12160180" y="6022389"/>
+            <a:ext cx="1559124" cy="1643856"/>
           </a:xfrm>
           <a:solidFill>
             <a:srgbClr val="ECECEC"/>
@@ -1410,8 +1435,8 @@
         </p:nvSpPr>
         <p:spPr>
           <a:xfrm>
-            <a:off x="12991910" y="5071485"/>
-            <a:ext cx="1385888" cy="1384300"/>
+            <a:off x="14615899" y="6022389"/>
+            <a:ext cx="1559124" cy="1643856"/>
           </a:xfrm>
           <a:solidFill>
             <a:srgbClr val="ECECEC"/>
@@ -1455,8 +1480,8 @@
         </p:nvSpPr>
         <p:spPr>
           <a:xfrm>
-            <a:off x="15174771" y="5071485"/>
-            <a:ext cx="1385888" cy="1384300"/>
+            <a:off x="17071617" y="6022389"/>
+            <a:ext cx="1559124" cy="1643856"/>
           </a:xfrm>
           <a:solidFill>
             <a:srgbClr val="ECECEC"/>
@@ -1500,8 +1525,8 @@
         </p:nvSpPr>
         <p:spPr>
           <a:xfrm>
-            <a:off x="17357632" y="5071485"/>
-            <a:ext cx="1385888" cy="1384300"/>
+            <a:off x="19527336" y="6022389"/>
+            <a:ext cx="1559124" cy="1643856"/>
           </a:xfrm>
           <a:solidFill>
             <a:srgbClr val="ECECEC"/>
@@ -1545,8 +1570,8 @@
         </p:nvSpPr>
         <p:spPr>
           <a:xfrm>
-            <a:off x="19540493" y="5071485"/>
-            <a:ext cx="1385888" cy="1384300"/>
+            <a:off x="21983055" y="6022389"/>
+            <a:ext cx="1559124" cy="1643856"/>
           </a:xfrm>
           <a:solidFill>
             <a:srgbClr val="ECECEC"/>
@@ -1590,8 +1615,8 @@
         </p:nvSpPr>
         <p:spPr>
           <a:xfrm>
-            <a:off x="21723351" y="5071485"/>
-            <a:ext cx="1385888" cy="1384300"/>
+            <a:off x="24438770" y="6022389"/>
+            <a:ext cx="1559124" cy="1643856"/>
           </a:xfrm>
           <a:solidFill>
             <a:srgbClr val="ECECEC"/>
@@ -1635,8 +1660,8 @@
         </p:nvSpPr>
         <p:spPr>
           <a:xfrm>
-            <a:off x="2077605" y="7066539"/>
-            <a:ext cx="1385888" cy="1384300"/>
+            <a:off x="2337306" y="8391515"/>
+            <a:ext cx="1559124" cy="1643856"/>
           </a:xfrm>
           <a:solidFill>
             <a:srgbClr val="ECECEC"/>
@@ -1680,8 +1705,8 @@
         </p:nvSpPr>
         <p:spPr>
           <a:xfrm>
-            <a:off x="4260466" y="7066539"/>
-            <a:ext cx="1385888" cy="1384300"/>
+            <a:off x="4793024" y="8391515"/>
+            <a:ext cx="1559124" cy="1643856"/>
           </a:xfrm>
           <a:solidFill>
             <a:srgbClr val="ECECEC"/>
@@ -1725,8 +1750,8 @@
         </p:nvSpPr>
         <p:spPr>
           <a:xfrm>
-            <a:off x="6443327" y="7066539"/>
-            <a:ext cx="1385888" cy="1384300"/>
+            <a:off x="7248743" y="8391515"/>
+            <a:ext cx="1559124" cy="1643856"/>
           </a:xfrm>
           <a:solidFill>
             <a:srgbClr val="ECECEC"/>
@@ -1770,8 +1795,8 @@
         </p:nvSpPr>
         <p:spPr>
           <a:xfrm>
-            <a:off x="8626188" y="7066539"/>
-            <a:ext cx="1385888" cy="1384300"/>
+            <a:off x="9704462" y="8391515"/>
+            <a:ext cx="1559124" cy="1643856"/>
           </a:xfrm>
           <a:solidFill>
             <a:srgbClr val="ECECEC"/>
@@ -1815,8 +1840,8 @@
         </p:nvSpPr>
         <p:spPr>
           <a:xfrm>
-            <a:off x="10809049" y="7066539"/>
-            <a:ext cx="1385888" cy="1384300"/>
+            <a:off x="12160180" y="8391515"/>
+            <a:ext cx="1559124" cy="1643856"/>
           </a:xfrm>
           <a:solidFill>
             <a:srgbClr val="ECECEC"/>
@@ -1860,8 +1885,8 @@
         </p:nvSpPr>
         <p:spPr>
           <a:xfrm>
-            <a:off x="12991910" y="7066539"/>
-            <a:ext cx="1385888" cy="1384300"/>
+            <a:off x="14615899" y="8391515"/>
+            <a:ext cx="1559124" cy="1643856"/>
           </a:xfrm>
           <a:solidFill>
             <a:srgbClr val="ECECEC"/>
@@ -1905,8 +1930,8 @@
         </p:nvSpPr>
         <p:spPr>
           <a:xfrm>
-            <a:off x="15174771" y="7066539"/>
-            <a:ext cx="1385888" cy="1384300"/>
+            <a:off x="17071617" y="8391515"/>
+            <a:ext cx="1559124" cy="1643856"/>
           </a:xfrm>
           <a:solidFill>
             <a:srgbClr val="ECECEC"/>
@@ -1950,8 +1975,8 @@
         </p:nvSpPr>
         <p:spPr>
           <a:xfrm>
-            <a:off x="17357632" y="7066539"/>
-            <a:ext cx="1385888" cy="1384300"/>
+            <a:off x="19527336" y="8391515"/>
+            <a:ext cx="1559124" cy="1643856"/>
           </a:xfrm>
           <a:solidFill>
             <a:srgbClr val="ECECEC"/>
@@ -1995,8 +2020,8 @@
         </p:nvSpPr>
         <p:spPr>
           <a:xfrm>
-            <a:off x="19540493" y="7066539"/>
-            <a:ext cx="1385888" cy="1384300"/>
+            <a:off x="21983055" y="8391515"/>
+            <a:ext cx="1559124" cy="1643856"/>
           </a:xfrm>
           <a:solidFill>
             <a:srgbClr val="ECECEC"/>
@@ -2040,8 +2065,8 @@
         </p:nvSpPr>
         <p:spPr>
           <a:xfrm>
-            <a:off x="21723351" y="7066539"/>
-            <a:ext cx="1385888" cy="1384300"/>
+            <a:off x="24438770" y="8391515"/>
+            <a:ext cx="1559124" cy="1643856"/>
           </a:xfrm>
           <a:solidFill>
             <a:srgbClr val="ECECEC"/>
@@ -2113,8 +2138,8 @@
         </p:nvSpPr>
         <p:spPr>
           <a:xfrm>
-            <a:off x="1689100" y="355600"/>
-            <a:ext cx="21005800" cy="2286000"/>
+            <a:off x="1900238" y="422275"/>
+            <a:ext cx="23631525" cy="2714625"/>
           </a:xfrm>
           <a:prstGeom prst="rect">
             <a:avLst/>
@@ -2124,7 +2149,7 @@
           </a:ln>
           <a:extLst>
             <a:ext uri="{C572A759-6A51-4108-AA02-DFA0A04FC94B}">
-              <ma14:wrappingTextBoxFlag xmlns:ma14="http://schemas.microsoft.com/office/mac/drawingml/2011/main" xmlns:a14="http://schemas.microsoft.com/office/drawing/2010/main" xmlns:m="http://schemas.openxmlformats.org/officeDocument/2006/math" xmlns="" val="1"/>
+              <ma14:wrappingTextBoxFlag xmlns="" xmlns:m="http://schemas.openxmlformats.org/officeDocument/2006/math" xmlns:a14="http://schemas.microsoft.com/office/drawing/2010/main" xmlns:ma14="http://schemas.microsoft.com/office/mac/drawingml/2011/main" val="1"/>
             </a:ext>
           </a:extLst>
         </p:spPr>
@@ -2152,8 +2177,8 @@
         </p:nvSpPr>
         <p:spPr>
           <a:xfrm>
-            <a:off x="1689100" y="3149600"/>
-            <a:ext cx="21005800" cy="9296400"/>
+            <a:off x="1900238" y="3740150"/>
+            <a:ext cx="23631525" cy="11039475"/>
           </a:xfrm>
           <a:prstGeom prst="rect">
             <a:avLst/>
@@ -2163,7 +2188,7 @@
           </a:ln>
           <a:extLst>
             <a:ext uri="{C572A759-6A51-4108-AA02-DFA0A04FC94B}">
-              <ma14:wrappingTextBoxFlag xmlns:ma14="http://schemas.microsoft.com/office/mac/drawingml/2011/main" xmlns:a14="http://schemas.microsoft.com/office/drawing/2010/main" xmlns:m="http://schemas.openxmlformats.org/officeDocument/2006/math" xmlns="" val="1"/>
+              <ma14:wrappingTextBoxFlag xmlns="" xmlns:m="http://schemas.openxmlformats.org/officeDocument/2006/math" xmlns:a14="http://schemas.microsoft.com/office/drawing/2010/main" xmlns:ma14="http://schemas.microsoft.com/office/mac/drawingml/2011/main" val="1"/>
             </a:ext>
           </a:extLst>
         </p:spPr>
@@ -2215,8 +2240,8 @@
         </p:nvSpPr>
         <p:spPr>
           <a:xfrm>
-            <a:off x="11959031" y="13081000"/>
-            <a:ext cx="453238" cy="461059"/>
+            <a:off x="13464398" y="15533688"/>
+            <a:ext cx="488916" cy="471924"/>
           </a:xfrm>
           <a:prstGeom prst="rect">
             <a:avLst/>
@@ -2998,8 +3023,8 @@
         </p:nvSpPr>
         <p:spPr>
           <a:xfrm>
-            <a:off x="-186612" y="-186612"/>
-            <a:ext cx="24726122" cy="14201192"/>
+            <a:off x="0" y="0"/>
+            <a:ext cx="27432000" cy="16287749"/>
           </a:xfrm>
           <a:prstGeom prst="rect">
             <a:avLst/>
@@ -3036,31 +3061,11 @@
           </a:bodyPr>
           <a:lstStyle/>
           <a:p>
-            <a:pPr marL="0" marR="0" indent="0" algn="ctr" defTabSz="825500" rtl="0" fontAlgn="auto" latinLnBrk="0" hangingPunct="0">
-              <a:lnSpc>
-                <a:spcPct val="100000"/>
-              </a:lnSpc>
-              <a:spcBef>
-                <a:spcPts val="0"/>
-              </a:spcBef>
-              <a:spcAft>
-                <a:spcPts val="0"/>
-              </a:spcAft>
-              <a:buClrTx/>
-              <a:buSzTx/>
-              <a:buFontTx/>
-              <a:buNone/>
-              <a:tabLst/>
-            </a:pPr>
-            <a:endParaRPr kumimoji="0" lang="fr-FR" sz="3200" b="0" i="0" u="none" strike="noStrike" cap="none" spc="0" normalizeH="0" baseline="0" dirty="0">
-              <a:ln>
-                <a:noFill/>
-              </a:ln>
+            <a:pPr defTabSz="825500"/>
+            <a:endParaRPr lang="fr-FR" sz="3200" b="0" dirty="0">
               <a:solidFill>
                 <a:srgbClr val="FFFFFF"/>
               </a:solidFill>
-              <a:effectLst/>
-              <a:uFillTx/>
               <a:latin typeface="+mn-lt"/>
               <a:ea typeface="+mn-ea"/>
               <a:cs typeface="+mn-cs"/>
@@ -3083,7 +3088,7 @@
         </p:nvSpPr>
         <p:spPr>
           <a:xfrm flipV="1">
-            <a:off x="4333160" y="10531920"/>
+            <a:off x="5857161" y="11817796"/>
             <a:ext cx="868289" cy="1"/>
           </a:xfrm>
           <a:prstGeom prst="line">
@@ -3127,7 +3132,7 @@
         </p:nvSpPr>
         <p:spPr>
           <a:xfrm flipV="1">
-            <a:off x="4278087" y="3138413"/>
+            <a:off x="5802088" y="4424288"/>
             <a:ext cx="290015" cy="0"/>
           </a:xfrm>
           <a:prstGeom prst="line">
@@ -3171,7 +3176,7 @@
         </p:nvSpPr>
         <p:spPr>
           <a:xfrm>
-            <a:off x="12192000" y="7290668"/>
+            <a:off x="13716000" y="8576543"/>
             <a:ext cx="0" cy="1180166"/>
           </a:xfrm>
           <a:prstGeom prst="line">
@@ -3204,7 +3209,7 @@
                 <a:sym typeface="Helvetica Neue Medium"/>
               </a:defRPr>
             </a:pPr>
-            <a:endParaRPr dirty="0"/>
+            <a:endParaRPr sz="3200" dirty="0"/>
           </a:p>
         </p:txBody>
       </p:sp>
@@ -3222,7 +3227,7 @@
         </p:nvSpPr>
         <p:spPr>
           <a:xfrm rot="5400000">
-            <a:off x="2162319" y="3606870"/>
+            <a:off x="3686319" y="4892745"/>
             <a:ext cx="4291802" cy="532464"/>
           </a:xfrm>
           <a:custGeom>
@@ -3319,7 +3324,7 @@
         </p:nvSpPr>
         <p:spPr>
           <a:xfrm flipV="1">
-            <a:off x="4561504" y="3129747"/>
+            <a:off x="6085505" y="4415623"/>
             <a:ext cx="868289" cy="1"/>
           </a:xfrm>
           <a:prstGeom prst="line">
@@ -3363,7 +3368,7 @@
         </p:nvSpPr>
         <p:spPr>
           <a:xfrm>
-            <a:off x="8315550" y="7047592"/>
+            <a:off x="9839550" y="8333467"/>
             <a:ext cx="2575510" cy="0"/>
           </a:xfrm>
           <a:prstGeom prst="line">
@@ -3396,7 +3401,7 @@
                 <a:sym typeface="Helvetica Neue Medium"/>
               </a:defRPr>
             </a:pPr>
-            <a:endParaRPr dirty="0"/>
+            <a:endParaRPr sz="3200" dirty="0"/>
           </a:p>
         </p:txBody>
       </p:sp>
@@ -3408,7 +3413,7 @@
         </p:nvSpPr>
         <p:spPr>
           <a:xfrm flipV="1">
-            <a:off x="18814089" y="6936452"/>
+            <a:off x="20338090" y="8222327"/>
             <a:ext cx="1147677" cy="2"/>
           </a:xfrm>
           <a:prstGeom prst="line">
@@ -3455,7 +3460,7 @@
         </p:nvSpPr>
         <p:spPr>
           <a:xfrm flipV="1">
-            <a:off x="18829203" y="3206678"/>
+            <a:off x="20353203" y="4492553"/>
             <a:ext cx="837246" cy="0"/>
           </a:xfrm>
           <a:prstGeom prst="line">
@@ -3496,7 +3501,7 @@
         </p:nvSpPr>
         <p:spPr>
           <a:xfrm rot="16200000">
-            <a:off x="18717370" y="6718950"/>
+            <a:off x="20241370" y="8004825"/>
             <a:ext cx="2400396" cy="532464"/>
           </a:xfrm>
           <a:custGeom>
@@ -3590,7 +3595,7 @@
         </p:nvSpPr>
         <p:spPr>
           <a:xfrm>
-            <a:off x="19990888" y="5418402"/>
+            <a:off x="21514888" y="6704278"/>
             <a:ext cx="4265930" cy="703635"/>
           </a:xfrm>
           <a:custGeom>
@@ -3782,7 +3787,7 @@
                 <a:sym typeface="Helvetica Neue Medium"/>
               </a:defRPr>
             </a:pPr>
-            <a:endParaRPr dirty="0"/>
+            <a:endParaRPr sz="3200" dirty="0"/>
           </a:p>
         </p:txBody>
       </p:sp>
@@ -3794,7 +3799,7 @@
         </p:nvSpPr>
         <p:spPr>
           <a:xfrm>
-            <a:off x="21514828" y="5398022"/>
+            <a:off x="23038829" y="6683898"/>
             <a:ext cx="2379095" cy="748923"/>
           </a:xfrm>
           <a:prstGeom prst="rect">
@@ -3808,7 +3813,7 @@
           <a:effectLst/>
           <a:extLst>
             <a:ext uri="{C572A759-6A51-4108-AA02-DFA0A04FC94B}">
-              <ma14:wrappingTextBoxFlag xmlns:ma14="http://schemas.microsoft.com/office/mac/drawingml/2011/main" xmlns:a14="http://schemas.microsoft.com/office/drawing/2010/main" xmlns:m="http://schemas.openxmlformats.org/officeDocument/2006/math" xmlns="" val="1"/>
+              <ma14:wrappingTextBoxFlag xmlns="" xmlns:m="http://schemas.openxmlformats.org/officeDocument/2006/math" xmlns:a14="http://schemas.microsoft.com/office/drawing/2010/main" xmlns:ma14="http://schemas.microsoft.com/office/mac/drawingml/2011/main" val="1"/>
             </a:ext>
           </a:extLst>
         </p:spPr>
@@ -3853,7 +3858,7 @@
         </p:nvSpPr>
         <p:spPr>
           <a:xfrm>
-            <a:off x="20270739" y="5249639"/>
+            <a:off x="21794739" y="6535514"/>
             <a:ext cx="1066736" cy="1066736"/>
           </a:xfrm>
           <a:prstGeom prst="ellipse">
@@ -3893,7 +3898,7 @@
         </p:nvSpPr>
         <p:spPr>
           <a:xfrm>
-            <a:off x="19990888" y="7832919"/>
+            <a:off x="21514888" y="9118795"/>
             <a:ext cx="4265930" cy="703635"/>
           </a:xfrm>
           <a:custGeom>
@@ -4085,7 +4090,7 @@
                 <a:sym typeface="Helvetica Neue Medium"/>
               </a:defRPr>
             </a:pPr>
-            <a:endParaRPr dirty="0"/>
+            <a:endParaRPr sz="3200" dirty="0"/>
           </a:p>
         </p:txBody>
       </p:sp>
@@ -4097,7 +4102,7 @@
         </p:nvSpPr>
         <p:spPr>
           <a:xfrm>
-            <a:off x="21494266" y="7778673"/>
+            <a:off x="23018267" y="9064549"/>
             <a:ext cx="2413171" cy="748923"/>
           </a:xfrm>
           <a:prstGeom prst="rect">
@@ -4111,7 +4116,7 @@
           <a:effectLst/>
           <a:extLst>
             <a:ext uri="{C572A759-6A51-4108-AA02-DFA0A04FC94B}">
-              <ma14:wrappingTextBoxFlag xmlns:ma14="http://schemas.microsoft.com/office/mac/drawingml/2011/main" xmlns:a14="http://schemas.microsoft.com/office/drawing/2010/main" xmlns:m="http://schemas.openxmlformats.org/officeDocument/2006/math" xmlns="" val="1"/>
+              <ma14:wrappingTextBoxFlag xmlns="" xmlns:m="http://schemas.openxmlformats.org/officeDocument/2006/math" xmlns:a14="http://schemas.microsoft.com/office/drawing/2010/main" xmlns:ma14="http://schemas.microsoft.com/office/mac/drawingml/2011/main" val="1"/>
             </a:ext>
           </a:extLst>
         </p:spPr>
@@ -4155,7 +4160,7 @@
         </p:nvSpPr>
         <p:spPr>
           <a:xfrm>
-            <a:off x="20258039" y="7638751"/>
+            <a:off x="21782039" y="8924627"/>
             <a:ext cx="1066736" cy="1066737"/>
           </a:xfrm>
           <a:prstGeom prst="ellipse">
@@ -4195,7 +4200,7 @@
         </p:nvSpPr>
         <p:spPr>
           <a:xfrm>
-            <a:off x="14767386" y="7034892"/>
+            <a:off x="16291386" y="8320767"/>
             <a:ext cx="2646822" cy="0"/>
           </a:xfrm>
           <a:prstGeom prst="line">
@@ -4228,7 +4233,7 @@
                 <a:sym typeface="Helvetica Neue Medium"/>
               </a:defRPr>
             </a:pPr>
-            <a:endParaRPr dirty="0"/>
+            <a:endParaRPr sz="3200" dirty="0"/>
           </a:p>
         </p:txBody>
       </p:sp>
@@ -4240,7 +4245,7 @@
         </p:nvSpPr>
         <p:spPr>
           <a:xfrm rot="16200000">
-            <a:off x="12011992" y="6377158"/>
+            <a:off x="13535993" y="7663034"/>
             <a:ext cx="7339599" cy="1112861"/>
           </a:xfrm>
           <a:custGeom>
@@ -4326,7 +4331,7 @@
                 <a:sym typeface="Helvetica Neue Medium"/>
               </a:defRPr>
             </a:pPr>
-            <a:endParaRPr dirty="0"/>
+            <a:endParaRPr sz="3200" dirty="0"/>
           </a:p>
         </p:txBody>
       </p:sp>
@@ -4338,7 +4343,7 @@
         </p:nvSpPr>
         <p:spPr>
           <a:xfrm>
-            <a:off x="9622965" y="6432105"/>
+            <a:off x="11146966" y="7717981"/>
             <a:ext cx="5124847" cy="1230975"/>
           </a:xfrm>
           <a:custGeom>
@@ -4532,7 +4537,7 @@
                 <a:sym typeface="Helvetica Neue Medium"/>
               </a:defRPr>
             </a:pPr>
-            <a:endParaRPr dirty="0"/>
+            <a:endParaRPr sz="3200" dirty="0"/>
           </a:p>
         </p:txBody>
       </p:sp>
@@ -4544,7 +4549,7 @@
         </p:nvSpPr>
         <p:spPr>
           <a:xfrm>
-            <a:off x="11320075" y="6550932"/>
+            <a:off x="12844076" y="7836807"/>
             <a:ext cx="2986903" cy="1025922"/>
           </a:xfrm>
           <a:prstGeom prst="rect">
@@ -4558,7 +4563,7 @@
           <a:effectLst/>
           <a:extLst>
             <a:ext uri="{C572A759-6A51-4108-AA02-DFA0A04FC94B}">
-              <ma14:wrappingTextBoxFlag xmlns:ma14="http://schemas.microsoft.com/office/mac/drawingml/2011/main" xmlns:a14="http://schemas.microsoft.com/office/drawing/2010/main" xmlns:m="http://schemas.openxmlformats.org/officeDocument/2006/math" xmlns="" val="1"/>
+              <ma14:wrappingTextBoxFlag xmlns="" xmlns:m="http://schemas.openxmlformats.org/officeDocument/2006/math" xmlns:a14="http://schemas.microsoft.com/office/drawing/2010/main" xmlns:ma14="http://schemas.microsoft.com/office/mac/drawingml/2011/main" val="1"/>
             </a:ext>
           </a:extLst>
         </p:spPr>
@@ -4604,7 +4609,7 @@
         </p:nvSpPr>
         <p:spPr>
           <a:xfrm>
-            <a:off x="9642539" y="6174764"/>
+            <a:off x="11166539" y="7460639"/>
             <a:ext cx="1720256" cy="1720256"/>
           </a:xfrm>
           <a:prstGeom prst="ellipse">
@@ -4636,7 +4641,7 @@
                 <a:sym typeface="Helvetica Neue Medium"/>
               </a:defRPr>
             </a:pPr>
-            <a:endParaRPr dirty="0"/>
+            <a:endParaRPr sz="3200" dirty="0"/>
           </a:p>
         </p:txBody>
       </p:sp>
@@ -4648,7 +4653,7 @@
         </p:nvSpPr>
         <p:spPr>
           <a:xfrm>
-            <a:off x="15398178" y="6567055"/>
+            <a:off x="16922179" y="7852930"/>
             <a:ext cx="4065685" cy="897156"/>
           </a:xfrm>
           <a:custGeom>
@@ -4848,7 +4853,7 @@
         </p:nvSpPr>
         <p:spPr>
           <a:xfrm>
-            <a:off x="16710392" y="6620667"/>
+            <a:off x="18234393" y="7906543"/>
             <a:ext cx="2552953" cy="779701"/>
           </a:xfrm>
           <a:prstGeom prst="rect">
@@ -4862,7 +4867,7 @@
           <a:effectLst/>
           <a:extLst>
             <a:ext uri="{C572A759-6A51-4108-AA02-DFA0A04FC94B}">
-              <ma14:wrappingTextBoxFlag xmlns:ma14="http://schemas.microsoft.com/office/mac/drawingml/2011/main" xmlns:a14="http://schemas.microsoft.com/office/drawing/2010/main" xmlns:m="http://schemas.openxmlformats.org/officeDocument/2006/math" xmlns="" val="1"/>
+              <ma14:wrappingTextBoxFlag xmlns="" xmlns:m="http://schemas.openxmlformats.org/officeDocument/2006/math" xmlns:a14="http://schemas.microsoft.com/office/drawing/2010/main" xmlns:ma14="http://schemas.microsoft.com/office/mac/drawingml/2011/main" val="1"/>
             </a:ext>
           </a:extLst>
         </p:spPr>
@@ -4908,7 +4913,7 @@
         </p:nvSpPr>
         <p:spPr>
           <a:xfrm>
-            <a:off x="15391947" y="6378901"/>
+            <a:off x="16915948" y="7664776"/>
             <a:ext cx="1253751" cy="1253752"/>
           </a:xfrm>
           <a:prstGeom prst="ellipse">
@@ -4948,7 +4953,7 @@
         </p:nvSpPr>
         <p:spPr>
           <a:xfrm>
-            <a:off x="4948207" y="6603470"/>
+            <a:off x="6472208" y="7889345"/>
             <a:ext cx="4065685" cy="897156"/>
           </a:xfrm>
           <a:custGeom>
@@ -5148,7 +5153,7 @@
         </p:nvSpPr>
         <p:spPr>
           <a:xfrm>
-            <a:off x="5131603" y="6657824"/>
+            <a:off x="6655604" y="7943700"/>
             <a:ext cx="2637813" cy="779701"/>
           </a:xfrm>
           <a:prstGeom prst="rect">
@@ -5162,7 +5167,7 @@
           <a:effectLst/>
           <a:extLst>
             <a:ext uri="{C572A759-6A51-4108-AA02-DFA0A04FC94B}">
-              <ma14:wrappingTextBoxFlag xmlns:ma14="http://schemas.microsoft.com/office/mac/drawingml/2011/main" xmlns:a14="http://schemas.microsoft.com/office/drawing/2010/main" xmlns:m="http://schemas.openxmlformats.org/officeDocument/2006/math" xmlns="" val="1"/>
+              <ma14:wrappingTextBoxFlag xmlns="" xmlns:m="http://schemas.openxmlformats.org/officeDocument/2006/math" xmlns:a14="http://schemas.microsoft.com/office/drawing/2010/main" xmlns:ma14="http://schemas.microsoft.com/office/mac/drawingml/2011/main" val="1"/>
             </a:ext>
           </a:extLst>
         </p:spPr>
@@ -5208,7 +5213,7 @@
         </p:nvSpPr>
         <p:spPr>
           <a:xfrm>
-            <a:off x="7720038" y="6402614"/>
+            <a:off x="9244039" y="7688490"/>
             <a:ext cx="1253751" cy="1253751"/>
           </a:xfrm>
           <a:prstGeom prst="ellipse">
@@ -5248,7 +5253,7 @@
         </p:nvSpPr>
         <p:spPr>
           <a:xfrm>
-            <a:off x="15398178" y="2859060"/>
+            <a:off x="16922179" y="4144935"/>
             <a:ext cx="4065685" cy="897156"/>
           </a:xfrm>
           <a:custGeom>
@@ -5440,7 +5445,7 @@
                 <a:sym typeface="Helvetica Neue Medium"/>
               </a:defRPr>
             </a:pPr>
-            <a:endParaRPr dirty="0"/>
+            <a:endParaRPr sz="3200" dirty="0"/>
           </a:p>
         </p:txBody>
       </p:sp>
@@ -5452,7 +5457,7 @@
         </p:nvSpPr>
         <p:spPr>
           <a:xfrm>
-            <a:off x="16627639" y="2911428"/>
+            <a:off x="18151640" y="4197304"/>
             <a:ext cx="2682321" cy="779701"/>
           </a:xfrm>
           <a:prstGeom prst="rect">
@@ -5466,7 +5471,7 @@
           <a:effectLst/>
           <a:extLst>
             <a:ext uri="{C572A759-6A51-4108-AA02-DFA0A04FC94B}">
-              <ma14:wrappingTextBoxFlag xmlns:ma14="http://schemas.microsoft.com/office/mac/drawingml/2011/main" xmlns:a14="http://schemas.microsoft.com/office/drawing/2010/main" xmlns:m="http://schemas.openxmlformats.org/officeDocument/2006/math" xmlns="" val="1"/>
+              <ma14:wrappingTextBoxFlag xmlns="" xmlns:m="http://schemas.openxmlformats.org/officeDocument/2006/math" xmlns:a14="http://schemas.microsoft.com/office/drawing/2010/main" xmlns:ma14="http://schemas.microsoft.com/office/mac/drawingml/2011/main" val="1"/>
             </a:ext>
           </a:extLst>
         </p:spPr>
@@ -5512,7 +5517,7 @@
         </p:nvSpPr>
         <p:spPr>
           <a:xfrm>
-            <a:off x="15406461" y="2669845"/>
+            <a:off x="16930462" y="3955720"/>
             <a:ext cx="1253751" cy="1253752"/>
           </a:xfrm>
           <a:prstGeom prst="ellipse">
@@ -5567,7 +5572,7 @@
         </p:blipFill>
         <p:spPr>
           <a:xfrm>
-            <a:off x="15560764" y="6532672"/>
+            <a:off x="17084765" y="7818547"/>
             <a:ext cx="942975" cy="941388"/>
           </a:xfrm>
           <a:prstGeom prst="ellipse">
@@ -5598,7 +5603,7 @@
         </p:blipFill>
         <p:spPr>
           <a:xfrm>
-            <a:off x="20448588" y="5398301"/>
+            <a:off x="21972589" y="6684177"/>
             <a:ext cx="731837" cy="731837"/>
           </a:xfrm>
           <a:prstGeom prst="ellipse">
@@ -5629,7 +5634,7 @@
         </p:blipFill>
         <p:spPr>
           <a:xfrm>
-            <a:off x="7892030" y="6576104"/>
+            <a:off x="9416031" y="7861980"/>
             <a:ext cx="942975" cy="942975"/>
           </a:xfrm>
           <a:prstGeom prst="ellipse">
@@ -5666,7 +5671,7 @@
         </p:blipFill>
         <p:spPr>
           <a:xfrm>
-            <a:off x="20396672" y="7790063"/>
+            <a:off x="21920672" y="9075938"/>
             <a:ext cx="788516" cy="788516"/>
           </a:xfrm>
           <a:prstGeom prst="ellipse">
@@ -5697,7 +5702,7 @@
         </p:blipFill>
         <p:spPr>
           <a:xfrm>
-            <a:off x="9841503" y="6383338"/>
+            <a:off x="11365504" y="7669214"/>
             <a:ext cx="1292225" cy="1292225"/>
           </a:xfrm>
           <a:prstGeom prst="ellipse">
@@ -5728,7 +5733,7 @@
         </p:blipFill>
         <p:spPr>
           <a:xfrm>
-            <a:off x="15563939" y="2832753"/>
+            <a:off x="17087940" y="4118628"/>
             <a:ext cx="942975" cy="941388"/>
           </a:xfrm>
           <a:prstGeom prst="ellipse">
@@ -5750,7 +5755,7 @@
         </p:nvSpPr>
         <p:spPr>
           <a:xfrm rot="5400000">
-            <a:off x="5026925" y="6412613"/>
+            <a:off x="6550926" y="7698489"/>
             <a:ext cx="7339599" cy="1112861"/>
           </a:xfrm>
           <a:custGeom>
@@ -5847,7 +5852,7 @@
         </p:nvSpPr>
         <p:spPr>
           <a:xfrm>
-            <a:off x="4871315" y="2850925"/>
+            <a:off x="6395316" y="4136800"/>
             <a:ext cx="4065685" cy="897156"/>
           </a:xfrm>
           <a:custGeom>
@@ -6053,7 +6058,7 @@
         </p:nvSpPr>
         <p:spPr>
           <a:xfrm>
-            <a:off x="5005991" y="2904537"/>
+            <a:off x="6529992" y="4190413"/>
             <a:ext cx="2552953" cy="779701"/>
           </a:xfrm>
           <a:prstGeom prst="rect">
@@ -6067,7 +6072,7 @@
           <a:effectLst/>
           <a:extLst>
             <a:ext uri="{C572A759-6A51-4108-AA02-DFA0A04FC94B}">
-              <ma14:wrappingTextBoxFlag xmlns:ma14="http://schemas.microsoft.com/office/mac/drawingml/2011/main" xmlns:a14="http://schemas.microsoft.com/office/drawing/2010/main" xmlns:m="http://schemas.openxmlformats.org/officeDocument/2006/math" xmlns="" val="1"/>
+              <ma14:wrappingTextBoxFlag xmlns="" xmlns:m="http://schemas.openxmlformats.org/officeDocument/2006/math" xmlns:a14="http://schemas.microsoft.com/office/drawing/2010/main" xmlns:ma14="http://schemas.microsoft.com/office/mac/drawingml/2011/main" val="1"/>
             </a:ext>
           </a:extLst>
         </p:spPr>
@@ -6119,7 +6124,7 @@
         </p:nvSpPr>
         <p:spPr>
           <a:xfrm>
-            <a:off x="7548216" y="2662771"/>
+            <a:off x="9072217" y="3948646"/>
             <a:ext cx="1253751" cy="1253752"/>
           </a:xfrm>
           <a:prstGeom prst="ellipse">
@@ -6178,7 +6183,7 @@
         </p:blipFill>
         <p:spPr>
           <a:xfrm>
-            <a:off x="7717033" y="2835203"/>
+            <a:off x="9241034" y="4121078"/>
             <a:ext cx="942975" cy="941388"/>
           </a:xfrm>
           <a:prstGeom prst="ellipse">
@@ -6192,7 +6197,7 @@
           </a:ln>
           <a:extLst>
             <a:ext uri="{C572A759-6A51-4108-AA02-DFA0A04FC94B}">
-              <ma14:wrappingTextBoxFlag xmlns:ma14="http://schemas.microsoft.com/office/mac/drawingml/2011/main" xmlns:a14="http://schemas.microsoft.com/office/drawing/2010/main" xmlns:m="http://schemas.openxmlformats.org/officeDocument/2006/math" xmlns="" val="1"/>
+              <ma14:wrappingTextBoxFlag xmlns="" xmlns:m="http://schemas.openxmlformats.org/officeDocument/2006/math" xmlns:a14="http://schemas.microsoft.com/office/drawing/2010/main" xmlns:ma14="http://schemas.microsoft.com/office/mac/drawingml/2011/main" val="1"/>
             </a:ext>
           </a:extLst>
         </p:spPr>
@@ -6211,7 +6216,7 @@
         </p:nvSpPr>
         <p:spPr>
           <a:xfrm>
-            <a:off x="15372591" y="10135279"/>
+            <a:off x="16896591" y="11421154"/>
             <a:ext cx="6262128" cy="897156"/>
           </a:xfrm>
           <a:custGeom>
@@ -6417,7 +6422,7 @@
         </p:nvSpPr>
         <p:spPr>
           <a:xfrm>
-            <a:off x="17589750" y="10171468"/>
+            <a:off x="19113750" y="11457344"/>
             <a:ext cx="4153398" cy="779701"/>
           </a:xfrm>
           <a:prstGeom prst="rect">
@@ -6431,7 +6436,7 @@
           <a:effectLst/>
           <a:extLst>
             <a:ext uri="{C572A759-6A51-4108-AA02-DFA0A04FC94B}">
-              <ma14:wrappingTextBoxFlag xmlns:ma14="http://schemas.microsoft.com/office/mac/drawingml/2011/main" xmlns:a14="http://schemas.microsoft.com/office/drawing/2010/main" xmlns:m="http://schemas.openxmlformats.org/officeDocument/2006/math" xmlns="" val="1"/>
+              <ma14:wrappingTextBoxFlag xmlns="" xmlns:m="http://schemas.openxmlformats.org/officeDocument/2006/math" xmlns:a14="http://schemas.microsoft.com/office/drawing/2010/main" xmlns:ma14="http://schemas.microsoft.com/office/mac/drawingml/2011/main" val="1"/>
             </a:ext>
           </a:extLst>
         </p:spPr>
@@ -6482,7 +6487,7 @@
         </p:nvSpPr>
         <p:spPr>
           <a:xfrm>
-            <a:off x="15357479" y="9972525"/>
+            <a:off x="16881480" y="11258400"/>
             <a:ext cx="1253751" cy="1253752"/>
           </a:xfrm>
           <a:prstGeom prst="ellipse">
@@ -6541,7 +6546,7 @@
         </p:blipFill>
         <p:spPr>
           <a:xfrm>
-            <a:off x="15500896" y="10119557"/>
+            <a:off x="17024897" y="11405432"/>
             <a:ext cx="942975" cy="941388"/>
           </a:xfrm>
           <a:prstGeom prst="ellipse">
@@ -6555,7 +6560,7 @@
           </a:ln>
           <a:extLst>
             <a:ext uri="{C572A759-6A51-4108-AA02-DFA0A04FC94B}">
-              <ma14:wrappingTextBoxFlag xmlns:ma14="http://schemas.microsoft.com/office/mac/drawingml/2011/main" xmlns:a14="http://schemas.microsoft.com/office/drawing/2010/main" xmlns:m="http://schemas.openxmlformats.org/officeDocument/2006/math" xmlns="" val="1"/>
+              <ma14:wrappingTextBoxFlag xmlns="" xmlns:m="http://schemas.openxmlformats.org/officeDocument/2006/math" xmlns:a14="http://schemas.microsoft.com/office/drawing/2010/main" xmlns:ma14="http://schemas.microsoft.com/office/mac/drawingml/2011/main" val="1"/>
             </a:ext>
           </a:extLst>
         </p:spPr>
@@ -6574,7 +6579,7 @@
         </p:nvSpPr>
         <p:spPr>
           <a:xfrm>
-            <a:off x="106229" y="1397264"/>
+            <a:off x="1630230" y="2683140"/>
             <a:ext cx="4246559" cy="703635"/>
           </a:xfrm>
           <a:custGeom>
@@ -6766,7 +6771,7 @@
                 <a:sym typeface="Helvetica Neue Medium"/>
               </a:defRPr>
             </a:pPr>
-            <a:endParaRPr dirty="0"/>
+            <a:endParaRPr sz="3200" dirty="0"/>
           </a:p>
         </p:txBody>
       </p:sp>
@@ -6784,7 +6789,7 @@
         </p:nvSpPr>
         <p:spPr>
           <a:xfrm>
-            <a:off x="501026" y="1358357"/>
+            <a:off x="2025026" y="2644233"/>
             <a:ext cx="2232914" cy="748923"/>
           </a:xfrm>
           <a:prstGeom prst="rect">
@@ -6798,7 +6803,7 @@
           <a:effectLst/>
           <a:extLst>
             <a:ext uri="{C572A759-6A51-4108-AA02-DFA0A04FC94B}">
-              <ma14:wrappingTextBoxFlag xmlns:ma14="http://schemas.microsoft.com/office/mac/drawingml/2011/main" xmlns:a14="http://schemas.microsoft.com/office/drawing/2010/main" xmlns:m="http://schemas.openxmlformats.org/officeDocument/2006/math" xmlns="" val="1"/>
+              <ma14:wrappingTextBoxFlag xmlns="" xmlns:m="http://schemas.openxmlformats.org/officeDocument/2006/math" xmlns:a14="http://schemas.microsoft.com/office/drawing/2010/main" xmlns:ma14="http://schemas.microsoft.com/office/mac/drawingml/2011/main" val="1"/>
             </a:ext>
           </a:extLst>
         </p:spPr>
@@ -6848,7 +6853,7 @@
         </p:nvSpPr>
         <p:spPr>
           <a:xfrm>
-            <a:off x="2967677" y="1241199"/>
+            <a:off x="4491677" y="2527075"/>
             <a:ext cx="1066736" cy="1066737"/>
           </a:xfrm>
           <a:prstGeom prst="ellipse">
@@ -6907,7 +6912,7 @@
         </p:blipFill>
         <p:spPr>
           <a:xfrm>
-            <a:off x="3109125" y="1382977"/>
+            <a:off x="4633125" y="2668852"/>
             <a:ext cx="790904" cy="790904"/>
           </a:xfrm>
           <a:prstGeom prst="ellipse">
@@ -6921,7 +6926,7 @@
           </a:ln>
           <a:extLst>
             <a:ext uri="{C572A759-6A51-4108-AA02-DFA0A04FC94B}">
-              <ma14:wrappingTextBoxFlag xmlns:ma14="http://schemas.microsoft.com/office/mac/drawingml/2011/main" xmlns:a14="http://schemas.microsoft.com/office/drawing/2010/main" xmlns:m="http://schemas.openxmlformats.org/officeDocument/2006/math" xmlns="" val="1"/>
+              <ma14:wrappingTextBoxFlag xmlns="" xmlns:m="http://schemas.openxmlformats.org/officeDocument/2006/math" xmlns:a14="http://schemas.microsoft.com/office/drawing/2010/main" xmlns:ma14="http://schemas.microsoft.com/office/mac/drawingml/2011/main" val="1"/>
             </a:ext>
           </a:extLst>
         </p:spPr>
@@ -6940,7 +6945,7 @@
         </p:nvSpPr>
         <p:spPr>
           <a:xfrm>
-            <a:off x="106229" y="2811305"/>
+            <a:off x="1630230" y="4097181"/>
             <a:ext cx="4246559" cy="703635"/>
           </a:xfrm>
           <a:custGeom>
@@ -7132,7 +7137,7 @@
                 <a:sym typeface="Helvetica Neue Medium"/>
               </a:defRPr>
             </a:pPr>
-            <a:endParaRPr dirty="0"/>
+            <a:endParaRPr sz="3200" dirty="0"/>
           </a:p>
         </p:txBody>
       </p:sp>
@@ -7150,7 +7155,7 @@
         </p:nvSpPr>
         <p:spPr>
           <a:xfrm>
-            <a:off x="388276" y="2772398"/>
+            <a:off x="1912277" y="4058274"/>
             <a:ext cx="2455269" cy="748923"/>
           </a:xfrm>
           <a:prstGeom prst="rect">
@@ -7164,7 +7169,7 @@
           <a:effectLst/>
           <a:extLst>
             <a:ext uri="{C572A759-6A51-4108-AA02-DFA0A04FC94B}">
-              <ma14:wrappingTextBoxFlag xmlns:ma14="http://schemas.microsoft.com/office/mac/drawingml/2011/main" xmlns:a14="http://schemas.microsoft.com/office/drawing/2010/main" xmlns:m="http://schemas.openxmlformats.org/officeDocument/2006/math" xmlns="" val="1"/>
+              <ma14:wrappingTextBoxFlag xmlns="" xmlns:m="http://schemas.openxmlformats.org/officeDocument/2006/math" xmlns:a14="http://schemas.microsoft.com/office/drawing/2010/main" xmlns:ma14="http://schemas.microsoft.com/office/mac/drawingml/2011/main" val="1"/>
             </a:ext>
           </a:extLst>
         </p:spPr>
@@ -7214,7 +7219,7 @@
         </p:nvSpPr>
         <p:spPr>
           <a:xfrm>
-            <a:off x="2980377" y="2658658"/>
+            <a:off x="4504377" y="3944534"/>
             <a:ext cx="1066736" cy="1066737"/>
           </a:xfrm>
           <a:prstGeom prst="ellipse">
@@ -7271,7 +7276,7 @@
         </p:nvSpPr>
         <p:spPr>
           <a:xfrm>
-            <a:off x="94864" y="5647171"/>
+            <a:off x="1618865" y="6933047"/>
             <a:ext cx="4246559" cy="703635"/>
           </a:xfrm>
           <a:custGeom>
@@ -7463,7 +7468,7 @@
                 <a:sym typeface="Helvetica Neue Medium"/>
               </a:defRPr>
             </a:pPr>
-            <a:endParaRPr dirty="0"/>
+            <a:endParaRPr sz="3200" dirty="0"/>
           </a:p>
         </p:txBody>
       </p:sp>
@@ -7481,7 +7486,7 @@
         </p:nvSpPr>
         <p:spPr>
           <a:xfrm>
-            <a:off x="489661" y="5608264"/>
+            <a:off x="2013661" y="6894140"/>
             <a:ext cx="2232914" cy="748923"/>
           </a:xfrm>
           <a:prstGeom prst="rect">
@@ -7495,7 +7500,7 @@
           <a:effectLst/>
           <a:extLst>
             <a:ext uri="{C572A759-6A51-4108-AA02-DFA0A04FC94B}">
-              <ma14:wrappingTextBoxFlag xmlns:ma14="http://schemas.microsoft.com/office/mac/drawingml/2011/main" xmlns:a14="http://schemas.microsoft.com/office/drawing/2010/main" xmlns:m="http://schemas.openxmlformats.org/officeDocument/2006/math" xmlns="" val="1"/>
+              <ma14:wrappingTextBoxFlag xmlns="" xmlns:m="http://schemas.openxmlformats.org/officeDocument/2006/math" xmlns:a14="http://schemas.microsoft.com/office/drawing/2010/main" xmlns:ma14="http://schemas.microsoft.com/office/mac/drawingml/2011/main" val="1"/>
             </a:ext>
           </a:extLst>
         </p:spPr>
@@ -7545,7 +7550,7 @@
         </p:nvSpPr>
         <p:spPr>
           <a:xfrm>
-            <a:off x="2956312" y="5488298"/>
+            <a:off x="4480312" y="6774174"/>
             <a:ext cx="1066736" cy="1066737"/>
           </a:xfrm>
           <a:prstGeom prst="ellipse">
@@ -7602,7 +7607,7 @@
         </p:nvSpPr>
         <p:spPr>
           <a:xfrm>
-            <a:off x="47162" y="4261641"/>
+            <a:off x="1571163" y="5547517"/>
             <a:ext cx="4246559" cy="703635"/>
           </a:xfrm>
           <a:custGeom>
@@ -7794,7 +7799,7 @@
                 <a:sym typeface="Helvetica Neue Medium"/>
               </a:defRPr>
             </a:pPr>
-            <a:endParaRPr dirty="0"/>
+            <a:endParaRPr sz="3200" dirty="0"/>
           </a:p>
         </p:txBody>
       </p:sp>
@@ -7812,7 +7817,7 @@
         </p:nvSpPr>
         <p:spPr>
           <a:xfrm>
-            <a:off x="441959" y="4222734"/>
+            <a:off x="1965959" y="5508610"/>
             <a:ext cx="2232914" cy="748923"/>
           </a:xfrm>
           <a:prstGeom prst="rect">
@@ -7826,7 +7831,7 @@
           <a:effectLst/>
           <a:extLst>
             <a:ext uri="{C572A759-6A51-4108-AA02-DFA0A04FC94B}">
-              <ma14:wrappingTextBoxFlag xmlns:ma14="http://schemas.microsoft.com/office/mac/drawingml/2011/main" xmlns:a14="http://schemas.microsoft.com/office/drawing/2010/main" xmlns:m="http://schemas.openxmlformats.org/officeDocument/2006/math" xmlns="" val="1"/>
+              <ma14:wrappingTextBoxFlag xmlns="" xmlns:m="http://schemas.openxmlformats.org/officeDocument/2006/math" xmlns:a14="http://schemas.microsoft.com/office/drawing/2010/main" xmlns:ma14="http://schemas.microsoft.com/office/mac/drawingml/2011/main" val="1"/>
             </a:ext>
           </a:extLst>
         </p:spPr>
@@ -7876,7 +7881,7 @@
         </p:nvSpPr>
         <p:spPr>
           <a:xfrm>
-            <a:off x="2921310" y="4092876"/>
+            <a:off x="4445310" y="5378752"/>
             <a:ext cx="1066736" cy="1066737"/>
           </a:xfrm>
           <a:prstGeom prst="ellipse">
@@ -7935,7 +7940,7 @@
         </p:blipFill>
         <p:spPr>
           <a:xfrm>
-            <a:off x="3065535" y="4230195"/>
+            <a:off x="4589535" y="5516070"/>
             <a:ext cx="793174" cy="793174"/>
           </a:xfrm>
           <a:prstGeom prst="ellipse">
@@ -7949,7 +7954,7 @@
           </a:ln>
           <a:extLst>
             <a:ext uri="{C572A759-6A51-4108-AA02-DFA0A04FC94B}">
-              <ma14:wrappingTextBoxFlag xmlns:ma14="http://schemas.microsoft.com/office/mac/drawingml/2011/main" xmlns:a14="http://schemas.microsoft.com/office/drawing/2010/main" xmlns:m="http://schemas.openxmlformats.org/officeDocument/2006/math" xmlns="" val="1"/>
+              <ma14:wrappingTextBoxFlag xmlns="" xmlns:m="http://schemas.openxmlformats.org/officeDocument/2006/math" xmlns:a14="http://schemas.microsoft.com/office/drawing/2010/main" xmlns:ma14="http://schemas.microsoft.com/office/mac/drawingml/2011/main" val="1"/>
             </a:ext>
           </a:extLst>
         </p:spPr>
@@ -7968,7 +7973,7 @@
         </p:nvSpPr>
         <p:spPr>
           <a:xfrm>
-            <a:off x="9921722" y="8428207"/>
+            <a:off x="11445722" y="9714083"/>
             <a:ext cx="4561334" cy="1003303"/>
           </a:xfrm>
           <a:custGeom>
@@ -8160,7 +8165,7 @@
                 <a:sym typeface="Helvetica Neue Medium"/>
               </a:defRPr>
             </a:pPr>
-            <a:endParaRPr dirty="0"/>
+            <a:endParaRPr sz="3200" dirty="0"/>
           </a:p>
         </p:txBody>
       </p:sp>
@@ -8178,7 +8183,7 @@
         </p:nvSpPr>
         <p:spPr>
           <a:xfrm>
-            <a:off x="11281230" y="8470834"/>
+            <a:off x="12805231" y="9756710"/>
             <a:ext cx="3072035" cy="902811"/>
           </a:xfrm>
           <a:prstGeom prst="rect">
@@ -8192,7 +8197,7 @@
           <a:effectLst/>
           <a:extLst>
             <a:ext uri="{C572A759-6A51-4108-AA02-DFA0A04FC94B}">
-              <ma14:wrappingTextBoxFlag xmlns:ma14="http://schemas.microsoft.com/office/mac/drawingml/2011/main" xmlns:a14="http://schemas.microsoft.com/office/drawing/2010/main" xmlns:m="http://schemas.openxmlformats.org/officeDocument/2006/math" xmlns="" val="1"/>
+              <ma14:wrappingTextBoxFlag xmlns="" xmlns:m="http://schemas.openxmlformats.org/officeDocument/2006/math" xmlns:a14="http://schemas.microsoft.com/office/drawing/2010/main" xmlns:ma14="http://schemas.microsoft.com/office/mac/drawingml/2011/main" val="1"/>
             </a:ext>
           </a:extLst>
         </p:spPr>
@@ -8244,7 +8249,7 @@
         </p:nvSpPr>
         <p:spPr>
           <a:xfrm>
-            <a:off x="10006991" y="8185380"/>
+            <a:off x="11530992" y="9471255"/>
             <a:ext cx="1394827" cy="1402090"/>
           </a:xfrm>
           <a:prstGeom prst="ellipse">
@@ -8303,7 +8308,7 @@
         </p:blipFill>
         <p:spPr>
           <a:xfrm>
-            <a:off x="10170332" y="8354041"/>
+            <a:off x="11694332" y="9639916"/>
             <a:ext cx="1047768" cy="1053224"/>
           </a:xfrm>
           <a:prstGeom prst="ellipse">
@@ -8317,7 +8322,7 @@
           </a:ln>
           <a:extLst>
             <a:ext uri="{C572A759-6A51-4108-AA02-DFA0A04FC94B}">
-              <ma14:wrappingTextBoxFlag xmlns:ma14="http://schemas.microsoft.com/office/mac/drawingml/2011/main" xmlns:a14="http://schemas.microsoft.com/office/drawing/2010/main" xmlns:m="http://schemas.openxmlformats.org/officeDocument/2006/math" xmlns="" val="1"/>
+              <ma14:wrappingTextBoxFlag xmlns="" xmlns:m="http://schemas.openxmlformats.org/officeDocument/2006/math" xmlns:a14="http://schemas.microsoft.com/office/drawing/2010/main" xmlns:ma14="http://schemas.microsoft.com/office/mac/drawingml/2011/main" val="1"/>
             </a:ext>
           </a:extLst>
         </p:spPr>
@@ -8351,7 +8356,7 @@
         </p:blipFill>
         <p:spPr bwMode="auto">
           <a:xfrm>
-            <a:off x="10354027" y="715349"/>
+            <a:off x="11878027" y="2001224"/>
             <a:ext cx="3675946" cy="3675946"/>
           </a:xfrm>
           <a:prstGeom prst="rect">
@@ -8385,7 +8390,7 @@
         </p:nvCxnSpPr>
         <p:spPr>
           <a:xfrm flipV="1">
-            <a:off x="0" y="11984100"/>
+            <a:off x="1524000" y="13269976"/>
             <a:ext cx="24265284" cy="36037"/>
           </a:xfrm>
           <a:prstGeom prst="line">
@@ -8429,7 +8434,7 @@
         </p:nvSpPr>
         <p:spPr>
           <a:xfrm>
-            <a:off x="9310039" y="12072535"/>
+            <a:off x="10834039" y="13358411"/>
             <a:ext cx="5763922" cy="718145"/>
           </a:xfrm>
           <a:prstGeom prst="rect">
@@ -8461,34 +8466,13 @@
           </a:bodyPr>
           <a:lstStyle/>
           <a:p>
-            <a:pPr marL="0" marR="0" indent="0" algn="ctr" defTabSz="825500" rtl="0" fontAlgn="auto" latinLnBrk="0" hangingPunct="0">
-              <a:lnSpc>
-                <a:spcPct val="100000"/>
-              </a:lnSpc>
-              <a:spcBef>
-                <a:spcPts val="0"/>
-              </a:spcBef>
-              <a:spcAft>
-                <a:spcPts val="0"/>
-              </a:spcAft>
-              <a:buClrTx/>
-              <a:buSzTx/>
-              <a:buFontTx/>
-              <a:buNone/>
-              <a:tabLst/>
-            </a:pPr>
+            <a:pPr defTabSz="825500"/>
             <a:r>
-              <a:rPr kumimoji="0" lang="fr-FR" sz="4000" i="0" u="none" strike="noStrike" cap="none" spc="0" normalizeH="0" baseline="0" dirty="0">
-                <a:ln>
-                  <a:noFill/>
-                </a:ln>
+              <a:rPr lang="fr-FR" sz="4000" dirty="0">
                 <a:solidFill>
                   <a:srgbClr val="175E7A"/>
                 </a:solidFill>
-                <a:effectLst/>
-                <a:uFillTx/>
                 <a:latin typeface="Eve Alpha" panose="02040502050405020303" pitchFamily="18" charset="0"/>
-                <a:sym typeface="Helvetica Neue"/>
               </a:rPr>
               <a:t>Emeritus</a:t>
             </a:r>
@@ -8509,7 +8493,7 @@
         </p:nvGrpSpPr>
         <p:grpSpPr>
           <a:xfrm>
-            <a:off x="2956312" y="12870141"/>
+            <a:off x="4480312" y="14156017"/>
             <a:ext cx="4265930" cy="1066737"/>
             <a:chOff x="2847631" y="12799055"/>
             <a:chExt cx="4265930" cy="1066737"/>
@@ -8751,7 +8735,7 @@
             <a:effectLst/>
             <a:extLst>
               <a:ext uri="{C572A759-6A51-4108-AA02-DFA0A04FC94B}">
-                <ma14:wrappingTextBoxFlag xmlns:ma14="http://schemas.microsoft.com/office/mac/drawingml/2011/main" xmlns:a14="http://schemas.microsoft.com/office/drawing/2010/main" xmlns:m="http://schemas.openxmlformats.org/officeDocument/2006/math" xmlns="" val="1"/>
+                <ma14:wrappingTextBoxFlag xmlns="" xmlns:m="http://schemas.openxmlformats.org/officeDocument/2006/math" xmlns:a14="http://schemas.microsoft.com/office/drawing/2010/main" xmlns:ma14="http://schemas.microsoft.com/office/mac/drawingml/2011/main" val="1"/>
               </a:ext>
             </a:extLst>
           </p:spPr>
@@ -8878,7 +8862,7 @@
             <a:effectLst/>
             <a:extLst>
               <a:ext uri="{C572A759-6A51-4108-AA02-DFA0A04FC94B}">
-                <ma14:wrappingTextBoxFlag xmlns:ma14="http://schemas.microsoft.com/office/mac/drawingml/2011/main" xmlns:a14="http://schemas.microsoft.com/office/drawing/2010/main" xmlns:m="http://schemas.openxmlformats.org/officeDocument/2006/math" xmlns="" val="1"/>
+                <ma14:wrappingTextBoxFlag xmlns="" xmlns:m="http://schemas.openxmlformats.org/officeDocument/2006/math" xmlns:a14="http://schemas.microsoft.com/office/drawing/2010/main" xmlns:ma14="http://schemas.microsoft.com/office/mac/drawingml/2011/main" val="1"/>
               </a:ext>
             </a:extLst>
           </p:spPr>
@@ -8898,7 +8882,7 @@
         </p:nvGrpSpPr>
         <p:grpSpPr>
           <a:xfrm>
-            <a:off x="7689382" y="12870141"/>
+            <a:off x="9213382" y="14156017"/>
             <a:ext cx="4265930" cy="1066737"/>
             <a:chOff x="7708538" y="12791651"/>
             <a:chExt cx="4265930" cy="1066737"/>
@@ -9140,7 +9124,7 @@
             <a:effectLst/>
             <a:extLst>
               <a:ext uri="{C572A759-6A51-4108-AA02-DFA0A04FC94B}">
-                <ma14:wrappingTextBoxFlag xmlns:ma14="http://schemas.microsoft.com/office/mac/drawingml/2011/main" xmlns:a14="http://schemas.microsoft.com/office/drawing/2010/main" xmlns:m="http://schemas.openxmlformats.org/officeDocument/2006/math" xmlns="" val="1"/>
+                <ma14:wrappingTextBoxFlag xmlns="" xmlns:m="http://schemas.openxmlformats.org/officeDocument/2006/math" xmlns:a14="http://schemas.microsoft.com/office/drawing/2010/main" xmlns:ma14="http://schemas.microsoft.com/office/mac/drawingml/2011/main" val="1"/>
               </a:ext>
             </a:extLst>
           </p:spPr>
@@ -9265,7 +9249,7 @@
             </a:ln>
             <a:extLst>
               <a:ext uri="{C572A759-6A51-4108-AA02-DFA0A04FC94B}">
-                <ma14:wrappingTextBoxFlag xmlns:ma14="http://schemas.microsoft.com/office/mac/drawingml/2011/main" xmlns:a14="http://schemas.microsoft.com/office/drawing/2010/main" xmlns:m="http://schemas.openxmlformats.org/officeDocument/2006/math" xmlns="" val="1"/>
+                <ma14:wrappingTextBoxFlag xmlns="" xmlns:m="http://schemas.openxmlformats.org/officeDocument/2006/math" xmlns:a14="http://schemas.microsoft.com/office/drawing/2010/main" xmlns:ma14="http://schemas.microsoft.com/office/mac/drawingml/2011/main" val="1"/>
               </a:ext>
             </a:extLst>
           </p:spPr>
@@ -9285,7 +9269,7 @@
         </p:nvGrpSpPr>
         <p:grpSpPr>
           <a:xfrm>
-            <a:off x="12422452" y="12870141"/>
+            <a:off x="13946452" y="14156017"/>
             <a:ext cx="4265930" cy="1066737"/>
             <a:chOff x="12525944" y="12872431"/>
             <a:chExt cx="4265930" cy="1066737"/>
@@ -9527,7 +9511,7 @@
             <a:effectLst/>
             <a:extLst>
               <a:ext uri="{C572A759-6A51-4108-AA02-DFA0A04FC94B}">
-                <ma14:wrappingTextBoxFlag xmlns:ma14="http://schemas.microsoft.com/office/mac/drawingml/2011/main" xmlns:a14="http://schemas.microsoft.com/office/drawing/2010/main" xmlns:m="http://schemas.openxmlformats.org/officeDocument/2006/math" xmlns="" val="1"/>
+                <ma14:wrappingTextBoxFlag xmlns="" xmlns:m="http://schemas.openxmlformats.org/officeDocument/2006/math" xmlns:a14="http://schemas.microsoft.com/office/drawing/2010/main" xmlns:ma14="http://schemas.microsoft.com/office/mac/drawingml/2011/main" val="1"/>
               </a:ext>
             </a:extLst>
           </p:spPr>
@@ -9652,7 +9636,7 @@
             </a:ln>
             <a:extLst>
               <a:ext uri="{C572A759-6A51-4108-AA02-DFA0A04FC94B}">
-                <ma14:wrappingTextBoxFlag xmlns:ma14="http://schemas.microsoft.com/office/mac/drawingml/2011/main" xmlns:a14="http://schemas.microsoft.com/office/drawing/2010/main" xmlns:m="http://schemas.openxmlformats.org/officeDocument/2006/math" xmlns="" val="1"/>
+                <ma14:wrappingTextBoxFlag xmlns="" xmlns:m="http://schemas.openxmlformats.org/officeDocument/2006/math" xmlns:a14="http://schemas.microsoft.com/office/drawing/2010/main" xmlns:ma14="http://schemas.microsoft.com/office/mac/drawingml/2011/main" val="1"/>
               </a:ext>
             </a:extLst>
           </p:spPr>
@@ -9672,7 +9656,7 @@
         </p:nvGrpSpPr>
         <p:grpSpPr>
           <a:xfrm>
-            <a:off x="17155521" y="12870141"/>
+            <a:off x="18679521" y="14156017"/>
             <a:ext cx="4265930" cy="1066737"/>
             <a:chOff x="17046840" y="12836019"/>
             <a:chExt cx="4265930" cy="1066737"/>
@@ -9914,7 +9898,7 @@
             <a:effectLst/>
             <a:extLst>
               <a:ext uri="{C572A759-6A51-4108-AA02-DFA0A04FC94B}">
-                <ma14:wrappingTextBoxFlag xmlns:ma14="http://schemas.microsoft.com/office/mac/drawingml/2011/main" xmlns:a14="http://schemas.microsoft.com/office/drawing/2010/main" xmlns:m="http://schemas.openxmlformats.org/officeDocument/2006/math" xmlns="" val="1"/>
+                <ma14:wrappingTextBoxFlag xmlns="" xmlns:m="http://schemas.openxmlformats.org/officeDocument/2006/math" xmlns:a14="http://schemas.microsoft.com/office/drawing/2010/main" xmlns:ma14="http://schemas.microsoft.com/office/mac/drawingml/2011/main" val="1"/>
               </a:ext>
             </a:extLst>
           </p:spPr>
@@ -10039,7 +10023,7 @@
             </a:ln>
             <a:extLst>
               <a:ext uri="{C572A759-6A51-4108-AA02-DFA0A04FC94B}">
-                <ma14:wrappingTextBoxFlag xmlns:ma14="http://schemas.microsoft.com/office/mac/drawingml/2011/main" xmlns:a14="http://schemas.microsoft.com/office/drawing/2010/main" xmlns:m="http://schemas.openxmlformats.org/officeDocument/2006/math" xmlns="" val="1"/>
+                <ma14:wrappingTextBoxFlag xmlns="" xmlns:m="http://schemas.openxmlformats.org/officeDocument/2006/math" xmlns:a14="http://schemas.microsoft.com/office/drawing/2010/main" xmlns:ma14="http://schemas.microsoft.com/office/mac/drawingml/2011/main" val="1"/>
               </a:ext>
             </a:extLst>
           </p:spPr>
@@ -10059,7 +10043,7 @@
         </p:nvSpPr>
         <p:spPr>
           <a:xfrm>
-            <a:off x="19961766" y="6620504"/>
+            <a:off x="21485766" y="7906380"/>
             <a:ext cx="4265930" cy="703635"/>
           </a:xfrm>
           <a:custGeom>
@@ -10251,7 +10235,7 @@
                 <a:sym typeface="Helvetica Neue Medium"/>
               </a:defRPr>
             </a:pPr>
-            <a:endParaRPr dirty="0"/>
+            <a:endParaRPr sz="3200" dirty="0"/>
           </a:p>
         </p:txBody>
       </p:sp>
@@ -10269,7 +10253,7 @@
         </p:nvSpPr>
         <p:spPr>
           <a:xfrm>
-            <a:off x="21494172" y="6566258"/>
+            <a:off x="23018173" y="7852134"/>
             <a:ext cx="2362163" cy="748923"/>
           </a:xfrm>
           <a:prstGeom prst="rect">
@@ -10283,7 +10267,7 @@
           <a:effectLst/>
           <a:extLst>
             <a:ext uri="{C572A759-6A51-4108-AA02-DFA0A04FC94B}">
-              <ma14:wrappingTextBoxFlag xmlns:ma14="http://schemas.microsoft.com/office/mac/drawingml/2011/main" xmlns:a14="http://schemas.microsoft.com/office/drawing/2010/main" xmlns:m="http://schemas.openxmlformats.org/officeDocument/2006/math" xmlns="" val="1"/>
+              <ma14:wrappingTextBoxFlag xmlns="" xmlns:m="http://schemas.openxmlformats.org/officeDocument/2006/math" xmlns:a14="http://schemas.microsoft.com/office/drawing/2010/main" xmlns:ma14="http://schemas.microsoft.com/office/mac/drawingml/2011/main" val="1"/>
             </a:ext>
           </a:extLst>
         </p:spPr>
@@ -10333,7 +10317,7 @@
         </p:nvSpPr>
         <p:spPr>
           <a:xfrm>
-            <a:off x="20228917" y="6426336"/>
+            <a:off x="21752917" y="7712212"/>
             <a:ext cx="1066736" cy="1066737"/>
           </a:xfrm>
           <a:prstGeom prst="ellipse">
@@ -10386,7 +10370,7 @@
         </p:blipFill>
         <p:spPr>
           <a:xfrm>
-            <a:off x="20367550" y="6577648"/>
+            <a:off x="21891550" y="7863523"/>
             <a:ext cx="788516" cy="788516"/>
           </a:xfrm>
           <a:prstGeom prst="ellipse">
@@ -10400,7 +10384,7 @@
           </a:ln>
           <a:extLst>
             <a:ext uri="{C572A759-6A51-4108-AA02-DFA0A04FC94B}">
-              <ma14:wrappingTextBoxFlag xmlns:ma14="http://schemas.microsoft.com/office/mac/drawingml/2011/main" xmlns:a14="http://schemas.microsoft.com/office/drawing/2010/main" xmlns:m="http://schemas.openxmlformats.org/officeDocument/2006/math" xmlns="" val="1"/>
+              <ma14:wrappingTextBoxFlag xmlns="" xmlns:m="http://schemas.openxmlformats.org/officeDocument/2006/math" xmlns:a14="http://schemas.microsoft.com/office/drawing/2010/main" xmlns:ma14="http://schemas.microsoft.com/office/mac/drawingml/2011/main" val="1"/>
             </a:ext>
           </a:extLst>
         </p:spPr>
@@ -10419,7 +10403,7 @@
         </p:nvSpPr>
         <p:spPr>
           <a:xfrm flipV="1">
-            <a:off x="4292012" y="4593366"/>
+            <a:off x="5816013" y="5879241"/>
             <a:ext cx="290015" cy="0"/>
           </a:xfrm>
           <a:prstGeom prst="line">
@@ -10463,7 +10447,7 @@
         </p:nvSpPr>
         <p:spPr>
           <a:xfrm>
-            <a:off x="17972116" y="-9612"/>
+            <a:off x="19496117" y="1276264"/>
             <a:ext cx="6255581" cy="564257"/>
           </a:xfrm>
           <a:prstGeom prst="rect">
@@ -10495,35 +10479,14 @@
           </a:bodyPr>
           <a:lstStyle/>
           <a:p>
-            <a:pPr marL="0" marR="0" indent="0" algn="ctr" defTabSz="825500" rtl="0" fontAlgn="auto" latinLnBrk="0" hangingPunct="0">
-              <a:lnSpc>
-                <a:spcPct val="100000"/>
-              </a:lnSpc>
-              <a:spcBef>
-                <a:spcPts val="0"/>
-              </a:spcBef>
-              <a:spcAft>
-                <a:spcPts val="0"/>
-              </a:spcAft>
-              <a:buClrTx/>
-              <a:buSzTx/>
-              <a:buFontTx/>
-              <a:buNone/>
-              <a:tabLst/>
-            </a:pPr>
+            <a:pPr defTabSz="825500"/>
             <a:r>
-              <a:rPr kumimoji="0" lang="fr-FR" sz="3000" b="1" i="0" u="none" strike="noStrike" cap="none" spc="0" normalizeH="0" baseline="0" dirty="0">
-                <a:ln>
-                  <a:noFill/>
-                </a:ln>
+              <a:rPr lang="fr-FR" sz="3000" dirty="0">
                 <a:solidFill>
                   <a:srgbClr val="175E7A"/>
                 </a:solidFill>
-                <a:effectLst/>
-                <a:uFillTx/>
                 <a:latin typeface="Eve Alpha" panose="02040502050405020303" pitchFamily="18" charset="0"/>
                 <a:cs typeface="Kokila" panose="020B0502040204020203" pitchFamily="34" charset="0"/>
-                <a:sym typeface="Helvetica Neue"/>
               </a:rPr>
               <a:t>Brave Leadership Team</a:t>
             </a:r>
@@ -10544,7 +10507,7 @@
         </p:nvSpPr>
         <p:spPr>
           <a:xfrm>
-            <a:off x="16519887" y="9977893"/>
+            <a:off x="18043888" y="11263768"/>
             <a:ext cx="1253751" cy="1253752"/>
           </a:xfrm>
           <a:prstGeom prst="ellipse">
@@ -10603,7 +10566,7 @@
         </p:blipFill>
         <p:spPr>
           <a:xfrm>
-            <a:off x="16663304" y="10124925"/>
+            <a:off x="18187305" y="11410800"/>
             <a:ext cx="942975" cy="941388"/>
           </a:xfrm>
           <a:prstGeom prst="ellipse">
@@ -10617,7 +10580,7 @@
           </a:ln>
           <a:extLst>
             <a:ext uri="{C572A759-6A51-4108-AA02-DFA0A04FC94B}">
-              <ma14:wrappingTextBoxFlag xmlns:ma14="http://schemas.microsoft.com/office/mac/drawingml/2011/main" xmlns:a14="http://schemas.microsoft.com/office/drawing/2010/main" xmlns:m="http://schemas.openxmlformats.org/officeDocument/2006/math" xmlns="" val="1"/>
+              <ma14:wrappingTextBoxFlag xmlns="" xmlns:m="http://schemas.openxmlformats.org/officeDocument/2006/math" xmlns:a14="http://schemas.microsoft.com/office/drawing/2010/main" xmlns:ma14="http://schemas.microsoft.com/office/mac/drawingml/2011/main" val="1"/>
             </a:ext>
           </a:extLst>
         </p:spPr>
@@ -10636,7 +10599,7 @@
         </p:nvSpPr>
         <p:spPr>
           <a:xfrm flipV="1">
-            <a:off x="61262" y="10535695"/>
+            <a:off x="1585263" y="11821571"/>
             <a:ext cx="868289" cy="1"/>
           </a:xfrm>
           <a:prstGeom prst="line">
@@ -10680,7 +10643,7 @@
         </p:nvSpPr>
         <p:spPr>
           <a:xfrm>
-            <a:off x="4998377" y="10085467"/>
+            <a:off x="6522378" y="11371342"/>
             <a:ext cx="4065685" cy="897156"/>
           </a:xfrm>
           <a:custGeom>
@@ -10886,7 +10849,7 @@
         </p:nvSpPr>
         <p:spPr>
           <a:xfrm>
-            <a:off x="5174032" y="10139079"/>
+            <a:off x="6698033" y="11424955"/>
             <a:ext cx="2552953" cy="779701"/>
           </a:xfrm>
           <a:prstGeom prst="rect">
@@ -10900,7 +10863,7 @@
           <a:effectLst/>
           <a:extLst>
             <a:ext uri="{C572A759-6A51-4108-AA02-DFA0A04FC94B}">
-              <ma14:wrappingTextBoxFlag xmlns:ma14="http://schemas.microsoft.com/office/mac/drawingml/2011/main" xmlns:a14="http://schemas.microsoft.com/office/drawing/2010/main" xmlns:m="http://schemas.openxmlformats.org/officeDocument/2006/math" xmlns="" val="1"/>
+              <ma14:wrappingTextBoxFlag xmlns="" xmlns:m="http://schemas.openxmlformats.org/officeDocument/2006/math" xmlns:a14="http://schemas.microsoft.com/office/drawing/2010/main" xmlns:ma14="http://schemas.microsoft.com/office/mac/drawingml/2011/main" val="1"/>
             </a:ext>
           </a:extLst>
         </p:spPr>
@@ -10952,7 +10915,7 @@
         </p:nvSpPr>
         <p:spPr>
           <a:xfrm>
-            <a:off x="7760141" y="9894212"/>
+            <a:off x="9284142" y="11180087"/>
             <a:ext cx="1253751" cy="1253752"/>
           </a:xfrm>
           <a:prstGeom prst="ellipse">
@@ -11011,7 +10974,7 @@
         </p:blipFill>
         <p:spPr>
           <a:xfrm>
-            <a:off x="7928958" y="10037058"/>
+            <a:off x="9452959" y="11322933"/>
             <a:ext cx="942975" cy="941388"/>
           </a:xfrm>
           <a:prstGeom prst="ellipse">
@@ -11025,7 +10988,7 @@
           </a:ln>
           <a:extLst>
             <a:ext uri="{C572A759-6A51-4108-AA02-DFA0A04FC94B}">
-              <ma14:wrappingTextBoxFlag xmlns:ma14="http://schemas.microsoft.com/office/mac/drawingml/2011/main" xmlns:a14="http://schemas.microsoft.com/office/drawing/2010/main" xmlns:m="http://schemas.openxmlformats.org/officeDocument/2006/math" xmlns="" val="1"/>
+              <ma14:wrappingTextBoxFlag xmlns="" xmlns:m="http://schemas.openxmlformats.org/officeDocument/2006/math" xmlns:a14="http://schemas.microsoft.com/office/drawing/2010/main" xmlns:ma14="http://schemas.microsoft.com/office/mac/drawingml/2011/main" val="1"/>
             </a:ext>
           </a:extLst>
         </p:spPr>
@@ -11044,7 +11007,7 @@
         </p:nvSpPr>
         <p:spPr>
           <a:xfrm>
-            <a:off x="86858" y="10172899"/>
+            <a:off x="1610858" y="11458775"/>
             <a:ext cx="4265930" cy="703635"/>
           </a:xfrm>
           <a:custGeom>
@@ -11236,7 +11199,7 @@
                 <a:sym typeface="Helvetica Neue Medium"/>
               </a:defRPr>
             </a:pPr>
-            <a:endParaRPr dirty="0"/>
+            <a:endParaRPr sz="3200" dirty="0"/>
           </a:p>
         </p:txBody>
       </p:sp>
@@ -11254,7 +11217,7 @@
         </p:nvSpPr>
         <p:spPr>
           <a:xfrm>
-            <a:off x="689344" y="10157460"/>
+            <a:off x="2213344" y="11443336"/>
             <a:ext cx="1833548" cy="748923"/>
           </a:xfrm>
           <a:prstGeom prst="rect">
@@ -11268,7 +11231,7 @@
           <a:effectLst/>
           <a:extLst>
             <a:ext uri="{C572A759-6A51-4108-AA02-DFA0A04FC94B}">
-              <ma14:wrappingTextBoxFlag xmlns:ma14="http://schemas.microsoft.com/office/mac/drawingml/2011/main" xmlns:a14="http://schemas.microsoft.com/office/drawing/2010/main" xmlns:m="http://schemas.openxmlformats.org/officeDocument/2006/math" xmlns="" val="1"/>
+              <ma14:wrappingTextBoxFlag xmlns="" xmlns:m="http://schemas.openxmlformats.org/officeDocument/2006/math" xmlns:a14="http://schemas.microsoft.com/office/drawing/2010/main" xmlns:ma14="http://schemas.microsoft.com/office/mac/drawingml/2011/main" val="1"/>
             </a:ext>
           </a:extLst>
         </p:spPr>
@@ -11318,7 +11281,7 @@
         </p:nvSpPr>
         <p:spPr>
           <a:xfrm>
-            <a:off x="2995889" y="10000506"/>
+            <a:off x="4519889" y="11286382"/>
             <a:ext cx="1066736" cy="1066737"/>
           </a:xfrm>
           <a:prstGeom prst="ellipse">
@@ -11377,7 +11340,7 @@
         </p:blipFill>
         <p:spPr>
           <a:xfrm>
-            <a:off x="3176158" y="10149819"/>
+            <a:off x="4700159" y="11435694"/>
             <a:ext cx="731837" cy="730250"/>
           </a:xfrm>
           <a:prstGeom prst="ellipse">
@@ -11391,7 +11354,7 @@
           </a:ln>
           <a:extLst>
             <a:ext uri="{C572A759-6A51-4108-AA02-DFA0A04FC94B}">
-              <ma14:wrappingTextBoxFlag xmlns:ma14="http://schemas.microsoft.com/office/mac/drawingml/2011/main" xmlns:a14="http://schemas.microsoft.com/office/drawing/2010/main" xmlns:m="http://schemas.openxmlformats.org/officeDocument/2006/math" xmlns="" val="1"/>
+              <ma14:wrappingTextBoxFlag xmlns="" xmlns:m="http://schemas.openxmlformats.org/officeDocument/2006/math" xmlns:a14="http://schemas.microsoft.com/office/drawing/2010/main" xmlns:ma14="http://schemas.microsoft.com/office/mac/drawingml/2011/main" val="1"/>
             </a:ext>
           </a:extLst>
         </p:spPr>
@@ -11410,7 +11373,7 @@
         </p:nvSpPr>
         <p:spPr>
           <a:xfrm rot="16200000">
-            <a:off x="18720145" y="2930932"/>
+            <a:off x="20244145" y="4216807"/>
             <a:ext cx="2400396" cy="532464"/>
           </a:xfrm>
           <a:custGeom>
@@ -11510,7 +11473,7 @@
         </p:nvSpPr>
         <p:spPr>
           <a:xfrm>
-            <a:off x="19993663" y="1630384"/>
+            <a:off x="21517663" y="2916260"/>
             <a:ext cx="4265930" cy="703635"/>
           </a:xfrm>
           <a:custGeom>
@@ -11702,7 +11665,7 @@
                 <a:sym typeface="Helvetica Neue Medium"/>
               </a:defRPr>
             </a:pPr>
-            <a:endParaRPr dirty="0"/>
+            <a:endParaRPr sz="3200" dirty="0"/>
           </a:p>
         </p:txBody>
       </p:sp>
@@ -11720,7 +11683,7 @@
         </p:nvSpPr>
         <p:spPr>
           <a:xfrm>
-            <a:off x="21517603" y="1610004"/>
+            <a:off x="23041604" y="2895880"/>
             <a:ext cx="2379095" cy="748923"/>
           </a:xfrm>
           <a:prstGeom prst="rect">
@@ -11734,7 +11697,7 @@
           <a:effectLst/>
           <a:extLst>
             <a:ext uri="{C572A759-6A51-4108-AA02-DFA0A04FC94B}">
-              <ma14:wrappingTextBoxFlag xmlns:ma14="http://schemas.microsoft.com/office/mac/drawingml/2011/main" xmlns:a14="http://schemas.microsoft.com/office/drawing/2010/main" xmlns:m="http://schemas.openxmlformats.org/officeDocument/2006/math" xmlns="" val="1"/>
+              <ma14:wrappingTextBoxFlag xmlns="" xmlns:m="http://schemas.openxmlformats.org/officeDocument/2006/math" xmlns:a14="http://schemas.microsoft.com/office/drawing/2010/main" xmlns:ma14="http://schemas.microsoft.com/office/mac/drawingml/2011/main" val="1"/>
             </a:ext>
           </a:extLst>
         </p:spPr>
@@ -11785,7 +11748,7 @@
         </p:nvSpPr>
         <p:spPr>
           <a:xfrm>
-            <a:off x="20273514" y="1461621"/>
+            <a:off x="21797514" y="2747496"/>
             <a:ext cx="1066736" cy="1066736"/>
           </a:xfrm>
           <a:prstGeom prst="ellipse">
@@ -11831,7 +11794,7 @@
         </p:nvSpPr>
         <p:spPr>
           <a:xfrm>
-            <a:off x="19993663" y="4044901"/>
+            <a:off x="21517663" y="5330777"/>
             <a:ext cx="4265930" cy="703635"/>
           </a:xfrm>
           <a:custGeom>
@@ -12023,7 +11986,7 @@
                 <a:sym typeface="Helvetica Neue Medium"/>
               </a:defRPr>
             </a:pPr>
-            <a:endParaRPr dirty="0"/>
+            <a:endParaRPr sz="3200" dirty="0"/>
           </a:p>
         </p:txBody>
       </p:sp>
@@ -12041,7 +12004,7 @@
         </p:nvSpPr>
         <p:spPr>
           <a:xfrm>
-            <a:off x="21497041" y="3990655"/>
+            <a:off x="23021042" y="5276531"/>
             <a:ext cx="2413171" cy="748923"/>
           </a:xfrm>
           <a:prstGeom prst="rect">
@@ -12055,7 +12018,7 @@
           <a:effectLst/>
           <a:extLst>
             <a:ext uri="{C572A759-6A51-4108-AA02-DFA0A04FC94B}">
-              <ma14:wrappingTextBoxFlag xmlns:ma14="http://schemas.microsoft.com/office/mac/drawingml/2011/main" xmlns:a14="http://schemas.microsoft.com/office/drawing/2010/main" xmlns:m="http://schemas.openxmlformats.org/officeDocument/2006/math" xmlns="" val="1"/>
+              <ma14:wrappingTextBoxFlag xmlns="" xmlns:m="http://schemas.openxmlformats.org/officeDocument/2006/math" xmlns:a14="http://schemas.microsoft.com/office/drawing/2010/main" xmlns:ma14="http://schemas.microsoft.com/office/mac/drawingml/2011/main" val="1"/>
             </a:ext>
           </a:extLst>
         </p:spPr>
@@ -12105,7 +12068,7 @@
         </p:nvSpPr>
         <p:spPr>
           <a:xfrm>
-            <a:off x="20260814" y="3850733"/>
+            <a:off x="21784814" y="5136609"/>
             <a:ext cx="1066736" cy="1066737"/>
           </a:xfrm>
           <a:prstGeom prst="ellipse">
@@ -12175,7 +12138,7 @@
         </p:blipFill>
         <p:spPr>
           <a:xfrm>
-            <a:off x="20451363" y="1610283"/>
+            <a:off x="21975364" y="2896159"/>
             <a:ext cx="731837" cy="731837"/>
           </a:xfrm>
           <a:prstGeom prst="ellipse">
@@ -12189,7 +12152,7 @@
           </a:ln>
           <a:extLst>
             <a:ext uri="{C572A759-6A51-4108-AA02-DFA0A04FC94B}">
-              <ma14:wrappingTextBoxFlag xmlns:ma14="http://schemas.microsoft.com/office/mac/drawingml/2011/main" xmlns:a14="http://schemas.microsoft.com/office/drawing/2010/main" xmlns:m="http://schemas.openxmlformats.org/officeDocument/2006/math" xmlns="" val="1"/>
+              <ma14:wrappingTextBoxFlag xmlns="" xmlns:m="http://schemas.openxmlformats.org/officeDocument/2006/math" xmlns:a14="http://schemas.microsoft.com/office/drawing/2010/main" xmlns:ma14="http://schemas.microsoft.com/office/mac/drawingml/2011/main" val="1"/>
             </a:ext>
           </a:extLst>
         </p:spPr>
@@ -12208,7 +12171,7 @@
         </p:nvSpPr>
         <p:spPr>
           <a:xfrm>
-            <a:off x="19964541" y="2832486"/>
+            <a:off x="21488541" y="4118362"/>
             <a:ext cx="4265930" cy="703635"/>
           </a:xfrm>
           <a:custGeom>
@@ -12400,7 +12363,7 @@
                 <a:sym typeface="Helvetica Neue Medium"/>
               </a:defRPr>
             </a:pPr>
-            <a:endParaRPr dirty="0"/>
+            <a:endParaRPr sz="3200" dirty="0"/>
           </a:p>
         </p:txBody>
       </p:sp>
@@ -12418,7 +12381,7 @@
         </p:nvSpPr>
         <p:spPr>
           <a:xfrm>
-            <a:off x="21496947" y="2778240"/>
+            <a:off x="23020948" y="4064116"/>
             <a:ext cx="2362163" cy="748923"/>
           </a:xfrm>
           <a:prstGeom prst="rect">
@@ -12432,7 +12395,7 @@
           <a:effectLst/>
           <a:extLst>
             <a:ext uri="{C572A759-6A51-4108-AA02-DFA0A04FC94B}">
-              <ma14:wrappingTextBoxFlag xmlns:ma14="http://schemas.microsoft.com/office/mac/drawingml/2011/main" xmlns:a14="http://schemas.microsoft.com/office/drawing/2010/main" xmlns:m="http://schemas.openxmlformats.org/officeDocument/2006/math" xmlns="" val="1"/>
+              <ma14:wrappingTextBoxFlag xmlns="" xmlns:m="http://schemas.openxmlformats.org/officeDocument/2006/math" xmlns:a14="http://schemas.microsoft.com/office/drawing/2010/main" xmlns:ma14="http://schemas.microsoft.com/office/mac/drawingml/2011/main" val="1"/>
             </a:ext>
           </a:extLst>
         </p:spPr>
@@ -12482,7 +12445,7 @@
         </p:nvSpPr>
         <p:spPr>
           <a:xfrm>
-            <a:off x="20231692" y="2638318"/>
+            <a:off x="21755692" y="3924194"/>
             <a:ext cx="1066736" cy="1066737"/>
           </a:xfrm>
           <a:prstGeom prst="ellipse">
@@ -12541,7 +12504,7 @@
         </p:blipFill>
         <p:spPr>
           <a:xfrm>
-            <a:off x="20370325" y="2789630"/>
+            <a:off x="21894325" y="4075505"/>
             <a:ext cx="788516" cy="788516"/>
           </a:xfrm>
           <a:prstGeom prst="ellipse">
@@ -12555,7 +12518,7 @@
           </a:ln>
           <a:extLst>
             <a:ext uri="{C572A759-6A51-4108-AA02-DFA0A04FC94B}">
-              <ma14:wrappingTextBoxFlag xmlns:ma14="http://schemas.microsoft.com/office/mac/drawingml/2011/main" xmlns:a14="http://schemas.microsoft.com/office/drawing/2010/main" xmlns:m="http://schemas.openxmlformats.org/officeDocument/2006/math" xmlns="" val="1"/>
+              <ma14:wrappingTextBoxFlag xmlns="" xmlns:m="http://schemas.openxmlformats.org/officeDocument/2006/math" xmlns:a14="http://schemas.microsoft.com/office/drawing/2010/main" xmlns:ma14="http://schemas.microsoft.com/office/mac/drawingml/2011/main" val="1"/>
             </a:ext>
           </a:extLst>
         </p:spPr>

</xml_diff>